<commit_message>
retraining and testing LSTM model
</commit_message>
<xml_diff>
--- a/Documentation/Presentations/Meeting 22-04-22.pptx
+++ b/Documentation/Presentations/Meeting 22-04-22.pptx
@@ -9,7 +9,9 @@
     <p:sldId id="257" r:id="rId3"/>
     <p:sldId id="258" r:id="rId4"/>
     <p:sldId id="260" r:id="rId5"/>
-    <p:sldId id="259" r:id="rId6"/>
+    <p:sldId id="261" r:id="rId6"/>
+    <p:sldId id="259" r:id="rId7"/>
+    <p:sldId id="262" r:id="rId8"/>
   </p:sldIdLst>
   <p:sldSz cx="12192000" cy="6858000"/>
   <p:notesSz cx="6858000" cy="9144000"/>
@@ -108,6 +110,11 @@
       </a:defRPr>
     </a:lvl9pPr>
   </p:defaultTextStyle>
+  <p:extLst>
+    <p:ext uri="{EFAFB233-063F-42B5-8137-9DF3F51BA10A}">
+      <p15:sldGuideLst xmlns:p15="http://schemas.microsoft.com/office/powerpoint/2012/main"/>
+    </p:ext>
+  </p:extLst>
 </p:presentation>
 </file>
 
@@ -4026,8 +4033,13 @@
           <a:p>
             <a:r>
               <a:rPr lang="nl-BE" dirty="0"/>
-              <a:t>Pitch</a:t>
-            </a:r>
+              <a:t>Pitch 8 </a:t>
+            </a:r>
+            <a:r>
+              <a:rPr lang="nl-BE" dirty="0" err="1"/>
+              <a:t>epochs</a:t>
+            </a:r>
+            <a:endParaRPr lang="nl-BE" dirty="0"/>
           </a:p>
         </p:txBody>
       </p:sp>
@@ -4227,6 +4239,230 @@
           <p:cNvPr id="2" name="Titel 1">
             <a:extLst>
               <a:ext uri="{FF2B5EF4-FFF2-40B4-BE49-F238E27FC236}">
+                <a16:creationId xmlns:a16="http://schemas.microsoft.com/office/drawing/2014/main" id="{E1883FB0-08B7-49AA-9C3F-5A04417A7AEA}"/>
+              </a:ext>
+            </a:extLst>
+          </p:cNvPr>
+          <p:cNvSpPr>
+            <a:spLocks noGrp="1"/>
+          </p:cNvSpPr>
+          <p:nvPr>
+            <p:ph type="title"/>
+          </p:nvPr>
+        </p:nvSpPr>
+        <p:spPr/>
+        <p:txBody>
+          <a:bodyPr/>
+          <a:lstStyle/>
+          <a:p>
+            <a:r>
+              <a:rPr lang="nl-BE" dirty="0"/>
+              <a:t>Pitch 50 </a:t>
+            </a:r>
+            <a:r>
+              <a:rPr lang="nl-BE" dirty="0" err="1"/>
+              <a:t>epochs</a:t>
+            </a:r>
+            <a:endParaRPr lang="nl-BE" dirty="0"/>
+          </a:p>
+        </p:txBody>
+      </p:sp>
+      <p:sp>
+        <p:nvSpPr>
+          <p:cNvPr id="3" name="Tijdelijke aanduiding voor inhoud 2">
+            <a:extLst>
+              <a:ext uri="{FF2B5EF4-FFF2-40B4-BE49-F238E27FC236}">
+                <a16:creationId xmlns:a16="http://schemas.microsoft.com/office/drawing/2014/main" id="{F53AEA68-6534-49C7-83EC-307E6858B6CB}"/>
+              </a:ext>
+            </a:extLst>
+          </p:cNvPr>
+          <p:cNvSpPr>
+            <a:spLocks noGrp="1"/>
+          </p:cNvSpPr>
+          <p:nvPr>
+            <p:ph idx="1"/>
+          </p:nvPr>
+        </p:nvSpPr>
+        <p:spPr/>
+        <p:txBody>
+          <a:bodyPr>
+            <a:normAutofit fontScale="85000" lnSpcReduction="20000"/>
+          </a:bodyPr>
+          <a:lstStyle/>
+          <a:p>
+            <a:pPr marL="0" indent="0">
+              <a:buNone/>
+            </a:pPr>
+            <a:r>
+              <a:rPr lang="nl-BE" dirty="0"/>
+              <a:t>Pitch </a:t>
+            </a:r>
+            <a:r>
+              <a:rPr lang="nl-BE" dirty="0" err="1"/>
+              <a:t>prediction</a:t>
+            </a:r>
+            <a:endParaRPr lang="nl-BE" dirty="0"/>
+          </a:p>
+          <a:p>
+            <a:pPr marL="0" indent="0">
+              <a:buNone/>
+            </a:pPr>
+            <a:r>
+              <a:rPr lang="nl-BE" dirty="0"/>
+              <a:t>   MSE: 0.00061</a:t>
+            </a:r>
+          </a:p>
+          <a:p>
+            <a:pPr marL="0" indent="0">
+              <a:buNone/>
+            </a:pPr>
+            <a:r>
+              <a:rPr lang="nl-BE" dirty="0"/>
+              <a:t>   RMSE: 0.0248</a:t>
+            </a:r>
+          </a:p>
+          <a:p>
+            <a:pPr marL="0" indent="0">
+              <a:buNone/>
+            </a:pPr>
+            <a:r>
+              <a:rPr lang="nl-BE" dirty="0"/>
+              <a:t>   RMSE </a:t>
+            </a:r>
+            <a:r>
+              <a:rPr lang="nl-BE" dirty="0" err="1"/>
+              <a:t>denorm</a:t>
+            </a:r>
+            <a:r>
+              <a:rPr lang="nl-BE" dirty="0"/>
+              <a:t>: 2.23°</a:t>
+            </a:r>
+          </a:p>
+          <a:p>
+            <a:pPr marL="0" indent="0">
+              <a:buNone/>
+            </a:pPr>
+            <a:r>
+              <a:rPr lang="nl-BE" dirty="0"/>
+              <a:t>Zero </a:t>
+            </a:r>
+            <a:r>
+              <a:rPr lang="nl-BE" dirty="0" err="1"/>
+              <a:t>prediction</a:t>
+            </a:r>
+            <a:endParaRPr lang="nl-BE" dirty="0"/>
+          </a:p>
+          <a:p>
+            <a:pPr marL="0" indent="0">
+              <a:buNone/>
+            </a:pPr>
+            <a:r>
+              <a:rPr lang="nl-BE" dirty="0"/>
+              <a:t>   MSE 0: 0.00513</a:t>
+            </a:r>
+          </a:p>
+          <a:p>
+            <a:pPr marL="0" indent="0">
+              <a:buNone/>
+            </a:pPr>
+            <a:r>
+              <a:rPr lang="nl-BE" dirty="0"/>
+              <a:t>   RMSE 0: 0.0716</a:t>
+            </a:r>
+          </a:p>
+          <a:p>
+            <a:pPr marL="0" indent="0">
+              <a:buNone/>
+            </a:pPr>
+            <a:r>
+              <a:rPr lang="nl-BE" dirty="0"/>
+              <a:t>   RMSE </a:t>
+            </a:r>
+            <a:r>
+              <a:rPr lang="nl-BE" dirty="0" err="1"/>
+              <a:t>denorm</a:t>
+            </a:r>
+            <a:r>
+              <a:rPr lang="nl-BE" dirty="0"/>
+              <a:t>: 6.44°</a:t>
+            </a:r>
+          </a:p>
+          <a:p>
+            <a:pPr marL="0" indent="0">
+              <a:buNone/>
+            </a:pPr>
+            <a:r>
+              <a:rPr lang="nl-BE" dirty="0" err="1"/>
+              <a:t>Improvement</a:t>
+            </a:r>
+            <a:r>
+              <a:rPr lang="nl-BE" dirty="0"/>
+              <a:t> on zero </a:t>
+            </a:r>
+            <a:r>
+              <a:rPr lang="nl-BE" dirty="0" err="1"/>
+              <a:t>prediction</a:t>
+            </a:r>
+            <a:r>
+              <a:rPr lang="nl-BE" dirty="0"/>
+              <a:t>:</a:t>
+            </a:r>
+          </a:p>
+          <a:p>
+            <a:pPr marL="0" indent="0">
+              <a:buNone/>
+            </a:pPr>
+            <a:r>
+              <a:rPr lang="nl-BE" dirty="0"/>
+              <a:t>   MSE delta%: 840.98 %</a:t>
+            </a:r>
+          </a:p>
+          <a:p>
+            <a:pPr marL="0" indent="0">
+              <a:buNone/>
+            </a:pPr>
+            <a:r>
+              <a:rPr lang="nl-BE" dirty="0"/>
+              <a:t>   RMSE delta%: 288.71 %</a:t>
+            </a:r>
+          </a:p>
+        </p:txBody>
+      </p:sp>
+    </p:spTree>
+    <p:extLst>
+      <p:ext uri="{BB962C8B-B14F-4D97-AF65-F5344CB8AC3E}">
+        <p14:creationId xmlns:p14="http://schemas.microsoft.com/office/powerpoint/2010/main" val="352239956"/>
+      </p:ext>
+    </p:extLst>
+  </p:cSld>
+  <p:clrMapOvr>
+    <a:masterClrMapping/>
+  </p:clrMapOvr>
+</p:sld>
+</file>
+
+<file path=ppt/slides/slide6.xml><?xml version="1.0" encoding="utf-8"?>
+<p:sld xmlns:a="http://schemas.openxmlformats.org/drawingml/2006/main" xmlns:r="http://schemas.openxmlformats.org/officeDocument/2006/relationships" xmlns:p="http://schemas.openxmlformats.org/presentationml/2006/main">
+  <p:cSld>
+    <p:spTree>
+      <p:nvGrpSpPr>
+        <p:cNvPr id="1" name=""/>
+        <p:cNvGrpSpPr/>
+        <p:nvPr/>
+      </p:nvGrpSpPr>
+      <p:grpSpPr>
+        <a:xfrm>
+          <a:off x="0" y="0"/>
+          <a:ext cx="0" cy="0"/>
+          <a:chOff x="0" y="0"/>
+          <a:chExt cx="0" cy="0"/>
+        </a:xfrm>
+      </p:grpSpPr>
+      <p:sp>
+        <p:nvSpPr>
+          <p:cNvPr id="2" name="Titel 1">
+            <a:extLst>
+              <a:ext uri="{FF2B5EF4-FFF2-40B4-BE49-F238E27FC236}">
                 <a16:creationId xmlns:a16="http://schemas.microsoft.com/office/drawing/2014/main" id="{BD745513-1078-4511-B09A-7591AD4858C2}"/>
               </a:ext>
             </a:extLst>
@@ -4246,6 +4482,14 @@
             <a:r>
               <a:rPr lang="nl-BE" dirty="0" err="1"/>
               <a:t>Roll</a:t>
+            </a:r>
+            <a:r>
+              <a:rPr lang="nl-BE" dirty="0"/>
+              <a:t> 8 </a:t>
+            </a:r>
+            <a:r>
+              <a:rPr lang="nl-BE" dirty="0" err="1"/>
+              <a:t>epochs</a:t>
             </a:r>
             <a:endParaRPr lang="nl-BE" dirty="0"/>
           </a:p>
@@ -4416,6 +4660,238 @@
     <p:extLst>
       <p:ext uri="{BB962C8B-B14F-4D97-AF65-F5344CB8AC3E}">
         <p14:creationId xmlns:p14="http://schemas.microsoft.com/office/powerpoint/2010/main" val="366614722"/>
+      </p:ext>
+    </p:extLst>
+  </p:cSld>
+  <p:clrMapOvr>
+    <a:masterClrMapping/>
+  </p:clrMapOvr>
+</p:sld>
+</file>
+
+<file path=ppt/slides/slide7.xml><?xml version="1.0" encoding="utf-8"?>
+<p:sld xmlns:a="http://schemas.openxmlformats.org/drawingml/2006/main" xmlns:r="http://schemas.openxmlformats.org/officeDocument/2006/relationships" xmlns:p="http://schemas.openxmlformats.org/presentationml/2006/main">
+  <p:cSld>
+    <p:spTree>
+      <p:nvGrpSpPr>
+        <p:cNvPr id="1" name=""/>
+        <p:cNvGrpSpPr/>
+        <p:nvPr/>
+      </p:nvGrpSpPr>
+      <p:grpSpPr>
+        <a:xfrm>
+          <a:off x="0" y="0"/>
+          <a:ext cx="0" cy="0"/>
+          <a:chOff x="0" y="0"/>
+          <a:chExt cx="0" cy="0"/>
+        </a:xfrm>
+      </p:grpSpPr>
+      <p:sp>
+        <p:nvSpPr>
+          <p:cNvPr id="2" name="Titel 1">
+            <a:extLst>
+              <a:ext uri="{FF2B5EF4-FFF2-40B4-BE49-F238E27FC236}">
+                <a16:creationId xmlns:a16="http://schemas.microsoft.com/office/drawing/2014/main" id="{BD745513-1078-4511-B09A-7591AD4858C2}"/>
+              </a:ext>
+            </a:extLst>
+          </p:cNvPr>
+          <p:cNvSpPr>
+            <a:spLocks noGrp="1"/>
+          </p:cNvSpPr>
+          <p:nvPr>
+            <p:ph type="title"/>
+          </p:nvPr>
+        </p:nvSpPr>
+        <p:spPr/>
+        <p:txBody>
+          <a:bodyPr/>
+          <a:lstStyle/>
+          <a:p>
+            <a:r>
+              <a:rPr lang="nl-BE" dirty="0" err="1"/>
+              <a:t>Roll</a:t>
+            </a:r>
+            <a:r>
+              <a:rPr lang="nl-BE" dirty="0"/>
+              <a:t> 50 </a:t>
+            </a:r>
+            <a:r>
+              <a:rPr lang="nl-BE" dirty="0" err="1"/>
+              <a:t>epochs</a:t>
+            </a:r>
+            <a:endParaRPr lang="nl-BE" dirty="0"/>
+          </a:p>
+        </p:txBody>
+      </p:sp>
+      <p:sp>
+        <p:nvSpPr>
+          <p:cNvPr id="3" name="Tijdelijke aanduiding voor inhoud 2">
+            <a:extLst>
+              <a:ext uri="{FF2B5EF4-FFF2-40B4-BE49-F238E27FC236}">
+                <a16:creationId xmlns:a16="http://schemas.microsoft.com/office/drawing/2014/main" id="{9852C49B-AAB4-47A8-B295-E8FE617FD2A7}"/>
+              </a:ext>
+            </a:extLst>
+          </p:cNvPr>
+          <p:cNvSpPr>
+            <a:spLocks noGrp="1"/>
+          </p:cNvSpPr>
+          <p:nvPr>
+            <p:ph idx="1"/>
+          </p:nvPr>
+        </p:nvSpPr>
+        <p:spPr/>
+        <p:txBody>
+          <a:bodyPr>
+            <a:normAutofit fontScale="85000" lnSpcReduction="20000"/>
+          </a:bodyPr>
+          <a:lstStyle/>
+          <a:p>
+            <a:pPr marL="0" indent="0">
+              <a:buNone/>
+            </a:pPr>
+            <a:r>
+              <a:rPr lang="nl-BE" dirty="0" err="1"/>
+              <a:t>Roll</a:t>
+            </a:r>
+            <a:r>
+              <a:rPr lang="nl-BE" dirty="0"/>
+              <a:t> </a:t>
+            </a:r>
+            <a:r>
+              <a:rPr lang="nl-BE" dirty="0" err="1"/>
+              <a:t>prediction</a:t>
+            </a:r>
+            <a:endParaRPr lang="nl-BE" dirty="0"/>
+          </a:p>
+          <a:p>
+            <a:pPr marL="0" indent="0">
+              <a:buNone/>
+            </a:pPr>
+            <a:r>
+              <a:rPr lang="nl-BE" dirty="0"/>
+              <a:t>   MSE: 0.00048</a:t>
+            </a:r>
+          </a:p>
+          <a:p>
+            <a:pPr marL="0" indent="0">
+              <a:buNone/>
+            </a:pPr>
+            <a:r>
+              <a:rPr lang="nl-BE" dirty="0"/>
+              <a:t>   RMSE: 0.0218</a:t>
+            </a:r>
+          </a:p>
+          <a:p>
+            <a:pPr marL="0" indent="0">
+              <a:buNone/>
+            </a:pPr>
+            <a:r>
+              <a:rPr lang="nl-BE" dirty="0"/>
+              <a:t>   RMSE </a:t>
+            </a:r>
+            <a:r>
+              <a:rPr lang="nl-BE" dirty="0" err="1"/>
+              <a:t>denorm</a:t>
+            </a:r>
+            <a:r>
+              <a:rPr lang="nl-BE" dirty="0"/>
+              <a:t>: 1.96°</a:t>
+            </a:r>
+          </a:p>
+          <a:p>
+            <a:pPr marL="0" indent="0">
+              <a:buNone/>
+            </a:pPr>
+            <a:r>
+              <a:rPr lang="nl-BE" dirty="0"/>
+              <a:t>Zero </a:t>
+            </a:r>
+            <a:r>
+              <a:rPr lang="nl-BE" dirty="0" err="1"/>
+              <a:t>prediction</a:t>
+            </a:r>
+            <a:endParaRPr lang="nl-BE" dirty="0"/>
+          </a:p>
+          <a:p>
+            <a:pPr marL="0" indent="0">
+              <a:buNone/>
+            </a:pPr>
+            <a:r>
+              <a:rPr lang="nl-BE" dirty="0"/>
+              <a:t>   MSE 0: 0.00653</a:t>
+            </a:r>
+          </a:p>
+          <a:p>
+            <a:pPr marL="0" indent="0">
+              <a:buNone/>
+            </a:pPr>
+            <a:r>
+              <a:rPr lang="nl-BE" dirty="0"/>
+              <a:t>   RMSE 0: 0.0808</a:t>
+            </a:r>
+          </a:p>
+          <a:p>
+            <a:pPr marL="0" indent="0">
+              <a:buNone/>
+            </a:pPr>
+            <a:r>
+              <a:rPr lang="nl-BE" dirty="0"/>
+              <a:t>   RMSE </a:t>
+            </a:r>
+            <a:r>
+              <a:rPr lang="nl-BE" dirty="0" err="1"/>
+              <a:t>denorm</a:t>
+            </a:r>
+            <a:r>
+              <a:rPr lang="nl-BE" dirty="0"/>
+              <a:t>: 7.27°</a:t>
+            </a:r>
+          </a:p>
+          <a:p>
+            <a:pPr marL="0" indent="0">
+              <a:buNone/>
+            </a:pPr>
+            <a:r>
+              <a:rPr lang="nl-BE" dirty="0" err="1"/>
+              <a:t>Improvement</a:t>
+            </a:r>
+            <a:r>
+              <a:rPr lang="nl-BE" dirty="0"/>
+              <a:t> on zero </a:t>
+            </a:r>
+            <a:r>
+              <a:rPr lang="nl-BE" dirty="0" err="1"/>
+              <a:t>prediction</a:t>
+            </a:r>
+            <a:r>
+              <a:rPr lang="nl-BE" dirty="0"/>
+              <a:t>:</a:t>
+            </a:r>
+          </a:p>
+          <a:p>
+            <a:pPr marL="0" indent="0">
+              <a:buNone/>
+            </a:pPr>
+            <a:r>
+              <a:rPr lang="nl-BE" dirty="0"/>
+              <a:t>   MSE delta%: 1360.42 %</a:t>
+            </a:r>
+          </a:p>
+          <a:p>
+            <a:pPr marL="0" indent="0">
+              <a:buNone/>
+            </a:pPr>
+            <a:r>
+              <a:rPr lang="nl-BE" dirty="0"/>
+              <a:t>   RMSE delta%: 370.64 %</a:t>
+            </a:r>
+          </a:p>
+        </p:txBody>
+      </p:sp>
+    </p:spTree>
+    <p:extLst>
+      <p:ext uri="{BB962C8B-B14F-4D97-AF65-F5344CB8AC3E}">
+        <p14:creationId xmlns:p14="http://schemas.microsoft.com/office/powerpoint/2010/main" val="3517077887"/>
       </p:ext>
     </p:extLst>
   </p:cSld>

</xml_diff>

<commit_message>
cnn 10 in -> 60 out results
</commit_message>
<xml_diff>
--- a/Documentation/Presentations/Meeting 22-04-22.pptx
+++ b/Documentation/Presentations/Meeting 22-04-22.pptx
@@ -6,12 +6,16 @@
   </p:sldMasterIdLst>
   <p:sldIdLst>
     <p:sldId id="256" r:id="rId2"/>
-    <p:sldId id="257" r:id="rId3"/>
-    <p:sldId id="258" r:id="rId4"/>
-    <p:sldId id="260" r:id="rId5"/>
-    <p:sldId id="261" r:id="rId6"/>
-    <p:sldId id="259" r:id="rId7"/>
-    <p:sldId id="262" r:id="rId8"/>
+    <p:sldId id="263" r:id="rId3"/>
+    <p:sldId id="257" r:id="rId4"/>
+    <p:sldId id="258" r:id="rId5"/>
+    <p:sldId id="260" r:id="rId6"/>
+    <p:sldId id="261" r:id="rId7"/>
+    <p:sldId id="259" r:id="rId8"/>
+    <p:sldId id="262" r:id="rId9"/>
+    <p:sldId id="264" r:id="rId10"/>
+    <p:sldId id="265" r:id="rId11"/>
+    <p:sldId id="266" r:id="rId12"/>
   </p:sldIdLst>
   <p:sldSz cx="12192000" cy="6858000"/>
   <p:notesSz cx="6858000" cy="9144000"/>
@@ -267,7 +271,7 @@
           <a:p>
             <a:fld id="{7CB6E71D-8A23-499C-8B42-C5F5AD1CC328}" type="datetimeFigureOut">
               <a:rPr lang="nl-BE" smtClean="0"/>
-              <a:t>11/04/2022</a:t>
+              <a:t>21/04/2022</a:t>
             </a:fld>
             <a:endParaRPr lang="nl-BE"/>
           </a:p>
@@ -321,7 +325,7 @@
           <a:p>
             <a:fld id="{A7BD93BB-363D-4622-9583-19504A217089}" type="slidenum">
               <a:rPr lang="nl-BE" smtClean="0"/>
-              <a:t>‹nr.›</a:t>
+              <a:t>‹#›</a:t>
             </a:fld>
             <a:endParaRPr lang="nl-BE"/>
           </a:p>
@@ -467,7 +471,7 @@
           <a:p>
             <a:fld id="{7CB6E71D-8A23-499C-8B42-C5F5AD1CC328}" type="datetimeFigureOut">
               <a:rPr lang="nl-BE" smtClean="0"/>
-              <a:t>11/04/2022</a:t>
+              <a:t>21/04/2022</a:t>
             </a:fld>
             <a:endParaRPr lang="nl-BE"/>
           </a:p>
@@ -521,7 +525,7 @@
           <a:p>
             <a:fld id="{A7BD93BB-363D-4622-9583-19504A217089}" type="slidenum">
               <a:rPr lang="nl-BE" smtClean="0"/>
-              <a:t>‹nr.›</a:t>
+              <a:t>‹#›</a:t>
             </a:fld>
             <a:endParaRPr lang="nl-BE"/>
           </a:p>
@@ -677,7 +681,7 @@
           <a:p>
             <a:fld id="{7CB6E71D-8A23-499C-8B42-C5F5AD1CC328}" type="datetimeFigureOut">
               <a:rPr lang="nl-BE" smtClean="0"/>
-              <a:t>11/04/2022</a:t>
+              <a:t>21/04/2022</a:t>
             </a:fld>
             <a:endParaRPr lang="nl-BE"/>
           </a:p>
@@ -731,7 +735,7 @@
           <a:p>
             <a:fld id="{A7BD93BB-363D-4622-9583-19504A217089}" type="slidenum">
               <a:rPr lang="nl-BE" smtClean="0"/>
-              <a:t>‹nr.›</a:t>
+              <a:t>‹#›</a:t>
             </a:fld>
             <a:endParaRPr lang="nl-BE"/>
           </a:p>
@@ -877,7 +881,7 @@
           <a:p>
             <a:fld id="{7CB6E71D-8A23-499C-8B42-C5F5AD1CC328}" type="datetimeFigureOut">
               <a:rPr lang="nl-BE" smtClean="0"/>
-              <a:t>11/04/2022</a:t>
+              <a:t>21/04/2022</a:t>
             </a:fld>
             <a:endParaRPr lang="nl-BE"/>
           </a:p>
@@ -931,7 +935,7 @@
           <a:p>
             <a:fld id="{A7BD93BB-363D-4622-9583-19504A217089}" type="slidenum">
               <a:rPr lang="nl-BE" smtClean="0"/>
-              <a:t>‹nr.›</a:t>
+              <a:t>‹#›</a:t>
             </a:fld>
             <a:endParaRPr lang="nl-BE"/>
           </a:p>
@@ -1153,7 +1157,7 @@
           <a:p>
             <a:fld id="{7CB6E71D-8A23-499C-8B42-C5F5AD1CC328}" type="datetimeFigureOut">
               <a:rPr lang="nl-BE" smtClean="0"/>
-              <a:t>11/04/2022</a:t>
+              <a:t>21/04/2022</a:t>
             </a:fld>
             <a:endParaRPr lang="nl-BE"/>
           </a:p>
@@ -1207,7 +1211,7 @@
           <a:p>
             <a:fld id="{A7BD93BB-363D-4622-9583-19504A217089}" type="slidenum">
               <a:rPr lang="nl-BE" smtClean="0"/>
-              <a:t>‹nr.›</a:t>
+              <a:t>‹#›</a:t>
             </a:fld>
             <a:endParaRPr lang="nl-BE"/>
           </a:p>
@@ -1421,7 +1425,7 @@
           <a:p>
             <a:fld id="{7CB6E71D-8A23-499C-8B42-C5F5AD1CC328}" type="datetimeFigureOut">
               <a:rPr lang="nl-BE" smtClean="0"/>
-              <a:t>11/04/2022</a:t>
+              <a:t>21/04/2022</a:t>
             </a:fld>
             <a:endParaRPr lang="nl-BE"/>
           </a:p>
@@ -1475,7 +1479,7 @@
           <a:p>
             <a:fld id="{A7BD93BB-363D-4622-9583-19504A217089}" type="slidenum">
               <a:rPr lang="nl-BE" smtClean="0"/>
-              <a:t>‹nr.›</a:t>
+              <a:t>‹#›</a:t>
             </a:fld>
             <a:endParaRPr lang="nl-BE"/>
           </a:p>
@@ -1836,7 +1840,7 @@
           <a:p>
             <a:fld id="{7CB6E71D-8A23-499C-8B42-C5F5AD1CC328}" type="datetimeFigureOut">
               <a:rPr lang="nl-BE" smtClean="0"/>
-              <a:t>11/04/2022</a:t>
+              <a:t>21/04/2022</a:t>
             </a:fld>
             <a:endParaRPr lang="nl-BE"/>
           </a:p>
@@ -1890,7 +1894,7 @@
           <a:p>
             <a:fld id="{A7BD93BB-363D-4622-9583-19504A217089}" type="slidenum">
               <a:rPr lang="nl-BE" smtClean="0"/>
-              <a:t>‹nr.›</a:t>
+              <a:t>‹#›</a:t>
             </a:fld>
             <a:endParaRPr lang="nl-BE"/>
           </a:p>
@@ -1978,7 +1982,7 @@
           <a:p>
             <a:fld id="{7CB6E71D-8A23-499C-8B42-C5F5AD1CC328}" type="datetimeFigureOut">
               <a:rPr lang="nl-BE" smtClean="0"/>
-              <a:t>11/04/2022</a:t>
+              <a:t>21/04/2022</a:t>
             </a:fld>
             <a:endParaRPr lang="nl-BE"/>
           </a:p>
@@ -2032,7 +2036,7 @@
           <a:p>
             <a:fld id="{A7BD93BB-363D-4622-9583-19504A217089}" type="slidenum">
               <a:rPr lang="nl-BE" smtClean="0"/>
-              <a:t>‹nr.›</a:t>
+              <a:t>‹#›</a:t>
             </a:fld>
             <a:endParaRPr lang="nl-BE"/>
           </a:p>
@@ -2091,7 +2095,7 @@
           <a:p>
             <a:fld id="{7CB6E71D-8A23-499C-8B42-C5F5AD1CC328}" type="datetimeFigureOut">
               <a:rPr lang="nl-BE" smtClean="0"/>
-              <a:t>11/04/2022</a:t>
+              <a:t>21/04/2022</a:t>
             </a:fld>
             <a:endParaRPr lang="nl-BE"/>
           </a:p>
@@ -2145,7 +2149,7 @@
           <a:p>
             <a:fld id="{A7BD93BB-363D-4622-9583-19504A217089}" type="slidenum">
               <a:rPr lang="nl-BE" smtClean="0"/>
-              <a:t>‹nr.›</a:t>
+              <a:t>‹#›</a:t>
             </a:fld>
             <a:endParaRPr lang="nl-BE"/>
           </a:p>
@@ -2404,7 +2408,7 @@
           <a:p>
             <a:fld id="{7CB6E71D-8A23-499C-8B42-C5F5AD1CC328}" type="datetimeFigureOut">
               <a:rPr lang="nl-BE" smtClean="0"/>
-              <a:t>11/04/2022</a:t>
+              <a:t>21/04/2022</a:t>
             </a:fld>
             <a:endParaRPr lang="nl-BE"/>
           </a:p>
@@ -2458,7 +2462,7 @@
           <a:p>
             <a:fld id="{A7BD93BB-363D-4622-9583-19504A217089}" type="slidenum">
               <a:rPr lang="nl-BE" smtClean="0"/>
-              <a:t>‹nr.›</a:t>
+              <a:t>‹#›</a:t>
             </a:fld>
             <a:endParaRPr lang="nl-BE"/>
           </a:p>
@@ -2693,7 +2697,7 @@
           <a:p>
             <a:fld id="{7CB6E71D-8A23-499C-8B42-C5F5AD1CC328}" type="datetimeFigureOut">
               <a:rPr lang="nl-BE" smtClean="0"/>
-              <a:t>11/04/2022</a:t>
+              <a:t>21/04/2022</a:t>
             </a:fld>
             <a:endParaRPr lang="nl-BE"/>
           </a:p>
@@ -2747,7 +2751,7 @@
           <a:p>
             <a:fld id="{A7BD93BB-363D-4622-9583-19504A217089}" type="slidenum">
               <a:rPr lang="nl-BE" smtClean="0"/>
-              <a:t>‹nr.›</a:t>
+              <a:t>‹#›</a:t>
             </a:fld>
             <a:endParaRPr lang="nl-BE"/>
           </a:p>
@@ -2936,7 +2940,7 @@
           <a:p>
             <a:fld id="{7CB6E71D-8A23-499C-8B42-C5F5AD1CC328}" type="datetimeFigureOut">
               <a:rPr lang="nl-BE" smtClean="0"/>
-              <a:t>11/04/2022</a:t>
+              <a:t>21/04/2022</a:t>
             </a:fld>
             <a:endParaRPr lang="nl-BE"/>
           </a:p>
@@ -3026,7 +3030,7 @@
           <a:p>
             <a:fld id="{A7BD93BB-363D-4622-9583-19504A217089}" type="slidenum">
               <a:rPr lang="nl-BE" smtClean="0"/>
-              <a:t>‹nr.›</a:t>
+              <a:t>‹#›</a:t>
             </a:fld>
             <a:endParaRPr lang="nl-BE"/>
           </a:p>
@@ -3419,6 +3423,406 @@
 </p:sld>
 </file>
 
+<file path=ppt/slides/slide10.xml><?xml version="1.0" encoding="utf-8"?>
+<p:sld xmlns:a="http://schemas.openxmlformats.org/drawingml/2006/main" xmlns:r="http://schemas.openxmlformats.org/officeDocument/2006/relationships" xmlns:p="http://schemas.openxmlformats.org/presentationml/2006/main">
+  <p:cSld>
+    <p:spTree>
+      <p:nvGrpSpPr>
+        <p:cNvPr id="1" name=""/>
+        <p:cNvGrpSpPr/>
+        <p:nvPr/>
+      </p:nvGrpSpPr>
+      <p:grpSpPr>
+        <a:xfrm>
+          <a:off x="0" y="0"/>
+          <a:ext cx="0" cy="0"/>
+          <a:chOff x="0" y="0"/>
+          <a:chExt cx="0" cy="0"/>
+        </a:xfrm>
+      </p:grpSpPr>
+      <p:sp>
+        <p:nvSpPr>
+          <p:cNvPr id="2" name="Title 1">
+            <a:extLst>
+              <a:ext uri="{FF2B5EF4-FFF2-40B4-BE49-F238E27FC236}">
+                <a16:creationId xmlns:a16="http://schemas.microsoft.com/office/drawing/2014/main" id="{BDFB260B-37B7-4D02-992D-A6B4D31C0E2E}"/>
+              </a:ext>
+            </a:extLst>
+          </p:cNvPr>
+          <p:cNvSpPr>
+            <a:spLocks noGrp="1"/>
+          </p:cNvSpPr>
+          <p:nvPr>
+            <p:ph type="title"/>
+          </p:nvPr>
+        </p:nvSpPr>
+        <p:spPr/>
+        <p:txBody>
+          <a:bodyPr/>
+          <a:lstStyle/>
+          <a:p>
+            <a:r>
+              <a:rPr lang="nl-BE" dirty="0"/>
+              <a:t>CNN LSTM pitch</a:t>
+            </a:r>
+            <a:endParaRPr lang="en-US" dirty="0"/>
+          </a:p>
+        </p:txBody>
+      </p:sp>
+      <p:sp>
+        <p:nvSpPr>
+          <p:cNvPr id="3" name="Content Placeholder 2">
+            <a:extLst>
+              <a:ext uri="{FF2B5EF4-FFF2-40B4-BE49-F238E27FC236}">
+                <a16:creationId xmlns:a16="http://schemas.microsoft.com/office/drawing/2014/main" id="{82253F39-B8D0-47A8-A1B3-1F7B9B18E569}"/>
+              </a:ext>
+            </a:extLst>
+          </p:cNvPr>
+          <p:cNvSpPr>
+            <a:spLocks noGrp="1"/>
+          </p:cNvSpPr>
+          <p:nvPr>
+            <p:ph idx="1"/>
+          </p:nvPr>
+        </p:nvSpPr>
+        <p:spPr/>
+        <p:txBody>
+          <a:bodyPr>
+            <a:normAutofit fontScale="85000" lnSpcReduction="20000"/>
+          </a:bodyPr>
+          <a:lstStyle/>
+          <a:p>
+            <a:pPr marL="0" indent="0">
+              <a:buNone/>
+            </a:pPr>
+            <a:r>
+              <a:rPr lang="en-US" dirty="0"/>
+              <a:t>Pitch prediction</a:t>
+            </a:r>
+          </a:p>
+          <a:p>
+            <a:pPr marL="0" indent="0">
+              <a:buNone/>
+            </a:pPr>
+            <a:r>
+              <a:rPr lang="en-US" dirty="0"/>
+              <a:t>   MSE: 0.00028</a:t>
+            </a:r>
+          </a:p>
+          <a:p>
+            <a:pPr marL="0" indent="0">
+              <a:buNone/>
+            </a:pPr>
+            <a:r>
+              <a:rPr lang="en-US" dirty="0"/>
+              <a:t>   RMSE: 0.0168</a:t>
+            </a:r>
+          </a:p>
+          <a:p>
+            <a:pPr marL="0" indent="0">
+              <a:buNone/>
+            </a:pPr>
+            <a:r>
+              <a:rPr lang="en-US" dirty="0"/>
+              <a:t>   RMSE </a:t>
+            </a:r>
+            <a:r>
+              <a:rPr lang="en-US" dirty="0" err="1"/>
+              <a:t>denorm</a:t>
+            </a:r>
+            <a:r>
+              <a:rPr lang="en-US" dirty="0"/>
+              <a:t>: 1.51°</a:t>
+            </a:r>
+          </a:p>
+          <a:p>
+            <a:pPr marL="0" indent="0">
+              <a:buNone/>
+            </a:pPr>
+            <a:r>
+              <a:rPr lang="en-US" dirty="0"/>
+              <a:t>Zero prediction</a:t>
+            </a:r>
+          </a:p>
+          <a:p>
+            <a:pPr marL="0" indent="0">
+              <a:buNone/>
+            </a:pPr>
+            <a:r>
+              <a:rPr lang="en-US" dirty="0"/>
+              <a:t>   MSE 0: 0.00518</a:t>
+            </a:r>
+          </a:p>
+          <a:p>
+            <a:pPr marL="0" indent="0">
+              <a:buNone/>
+            </a:pPr>
+            <a:r>
+              <a:rPr lang="en-US" dirty="0"/>
+              <a:t>   RMSE 0: 0.072</a:t>
+            </a:r>
+          </a:p>
+          <a:p>
+            <a:pPr marL="0" indent="0">
+              <a:buNone/>
+            </a:pPr>
+            <a:r>
+              <a:rPr lang="en-US" dirty="0"/>
+              <a:t>   RMSE </a:t>
+            </a:r>
+            <a:r>
+              <a:rPr lang="en-US" dirty="0" err="1"/>
+              <a:t>denorm</a:t>
+            </a:r>
+            <a:r>
+              <a:rPr lang="en-US" dirty="0"/>
+              <a:t>: 6.48°</a:t>
+            </a:r>
+          </a:p>
+          <a:p>
+            <a:pPr marL="0" indent="0">
+              <a:buNone/>
+            </a:pPr>
+            <a:r>
+              <a:rPr lang="en-US" dirty="0"/>
+              <a:t>Improvement on zero prediction:</a:t>
+            </a:r>
+          </a:p>
+          <a:p>
+            <a:pPr marL="0" indent="0">
+              <a:buNone/>
+            </a:pPr>
+            <a:r>
+              <a:rPr lang="en-US" dirty="0"/>
+              <a:t>   MSE delta%: 1850.0 %</a:t>
+            </a:r>
+          </a:p>
+          <a:p>
+            <a:pPr marL="0" indent="0">
+              <a:buNone/>
+            </a:pPr>
+            <a:r>
+              <a:rPr lang="en-US" dirty="0"/>
+              <a:t>   RMSE delta%: 428.57 %</a:t>
+            </a:r>
+          </a:p>
+        </p:txBody>
+      </p:sp>
+    </p:spTree>
+    <p:extLst>
+      <p:ext uri="{BB962C8B-B14F-4D97-AF65-F5344CB8AC3E}">
+        <p14:creationId xmlns:p14="http://schemas.microsoft.com/office/powerpoint/2010/main" val="2692003294"/>
+      </p:ext>
+    </p:extLst>
+  </p:cSld>
+  <p:clrMapOvr>
+    <a:masterClrMapping/>
+  </p:clrMapOvr>
+</p:sld>
+</file>
+
+<file path=ppt/slides/slide11.xml><?xml version="1.0" encoding="utf-8"?>
+<p:sld xmlns:a="http://schemas.openxmlformats.org/drawingml/2006/main" xmlns:r="http://schemas.openxmlformats.org/officeDocument/2006/relationships" xmlns:p="http://schemas.openxmlformats.org/presentationml/2006/main">
+  <p:cSld>
+    <p:spTree>
+      <p:nvGrpSpPr>
+        <p:cNvPr id="1" name=""/>
+        <p:cNvGrpSpPr/>
+        <p:nvPr/>
+      </p:nvGrpSpPr>
+      <p:grpSpPr>
+        <a:xfrm>
+          <a:off x="0" y="0"/>
+          <a:ext cx="0" cy="0"/>
+          <a:chOff x="0" y="0"/>
+          <a:chExt cx="0" cy="0"/>
+        </a:xfrm>
+      </p:grpSpPr>
+      <p:sp>
+        <p:nvSpPr>
+          <p:cNvPr id="2" name="Title 1">
+            <a:extLst>
+              <a:ext uri="{FF2B5EF4-FFF2-40B4-BE49-F238E27FC236}">
+                <a16:creationId xmlns:a16="http://schemas.microsoft.com/office/drawing/2014/main" id="{CD5B8EF6-0369-4A79-B4E1-DB9528411B7E}"/>
+              </a:ext>
+            </a:extLst>
+          </p:cNvPr>
+          <p:cNvSpPr>
+            <a:spLocks noGrp="1"/>
+          </p:cNvSpPr>
+          <p:nvPr>
+            <p:ph type="title"/>
+          </p:nvPr>
+        </p:nvSpPr>
+        <p:spPr/>
+        <p:txBody>
+          <a:bodyPr/>
+          <a:lstStyle/>
+          <a:p>
+            <a:r>
+              <a:rPr lang="nl-BE" dirty="0"/>
+              <a:t>CNN LSTM </a:t>
+            </a:r>
+            <a:r>
+              <a:rPr lang="nl-BE" dirty="0" err="1"/>
+              <a:t>roll</a:t>
+            </a:r>
+            <a:endParaRPr lang="en-US" dirty="0"/>
+          </a:p>
+        </p:txBody>
+      </p:sp>
+      <p:sp>
+        <p:nvSpPr>
+          <p:cNvPr id="3" name="Content Placeholder 2">
+            <a:extLst>
+              <a:ext uri="{FF2B5EF4-FFF2-40B4-BE49-F238E27FC236}">
+                <a16:creationId xmlns:a16="http://schemas.microsoft.com/office/drawing/2014/main" id="{89F7D0BD-9BC3-48BF-A1CA-7BE99D527D54}"/>
+              </a:ext>
+            </a:extLst>
+          </p:cNvPr>
+          <p:cNvSpPr>
+            <a:spLocks noGrp="1"/>
+          </p:cNvSpPr>
+          <p:nvPr>
+            <p:ph idx="1"/>
+          </p:nvPr>
+        </p:nvSpPr>
+        <p:spPr/>
+        <p:txBody>
+          <a:bodyPr>
+            <a:normAutofit fontScale="85000" lnSpcReduction="20000"/>
+          </a:bodyPr>
+          <a:lstStyle/>
+          <a:p>
+            <a:pPr marL="0" indent="0">
+              <a:buNone/>
+            </a:pPr>
+            <a:r>
+              <a:rPr lang="en-US" dirty="0"/>
+              <a:t>Roll prediction</a:t>
+            </a:r>
+          </a:p>
+          <a:p>
+            <a:pPr marL="0" indent="0">
+              <a:buNone/>
+            </a:pPr>
+            <a:r>
+              <a:rPr lang="en-US" dirty="0"/>
+              <a:t>   MSE: 0.00026</a:t>
+            </a:r>
+          </a:p>
+          <a:p>
+            <a:pPr marL="0" indent="0">
+              <a:buNone/>
+            </a:pPr>
+            <a:r>
+              <a:rPr lang="en-US" dirty="0"/>
+              <a:t>   RMSE: 0.0162</a:t>
+            </a:r>
+          </a:p>
+          <a:p>
+            <a:pPr marL="0" indent="0">
+              <a:buNone/>
+            </a:pPr>
+            <a:r>
+              <a:rPr lang="en-US" dirty="0"/>
+              <a:t>   RMSE </a:t>
+            </a:r>
+            <a:r>
+              <a:rPr lang="en-US" dirty="0" err="1"/>
+              <a:t>denorm</a:t>
+            </a:r>
+            <a:r>
+              <a:rPr lang="en-US" dirty="0"/>
+              <a:t>: 1.46°</a:t>
+            </a:r>
+          </a:p>
+          <a:p>
+            <a:pPr marL="0" indent="0">
+              <a:buNone/>
+            </a:pPr>
+            <a:r>
+              <a:rPr lang="en-US" dirty="0"/>
+              <a:t>Zero prediction</a:t>
+            </a:r>
+          </a:p>
+          <a:p>
+            <a:pPr marL="0" indent="0">
+              <a:buNone/>
+            </a:pPr>
+            <a:r>
+              <a:rPr lang="en-US" dirty="0"/>
+              <a:t>   MSE 0: 0.00616</a:t>
+            </a:r>
+          </a:p>
+          <a:p>
+            <a:pPr marL="0" indent="0">
+              <a:buNone/>
+            </a:pPr>
+            <a:r>
+              <a:rPr lang="en-US" dirty="0"/>
+              <a:t>   RMSE 0: 0.0785</a:t>
+            </a:r>
+          </a:p>
+          <a:p>
+            <a:pPr marL="0" indent="0">
+              <a:buNone/>
+            </a:pPr>
+            <a:r>
+              <a:rPr lang="en-US" dirty="0"/>
+              <a:t>   RMSE </a:t>
+            </a:r>
+            <a:r>
+              <a:rPr lang="en-US" dirty="0" err="1"/>
+              <a:t>denorm</a:t>
+            </a:r>
+            <a:r>
+              <a:rPr lang="en-US" dirty="0"/>
+              <a:t>: 7.06°</a:t>
+            </a:r>
+          </a:p>
+          <a:p>
+            <a:pPr marL="0" indent="0">
+              <a:buNone/>
+            </a:pPr>
+            <a:r>
+              <a:rPr lang="en-US" dirty="0"/>
+              <a:t>Improvement on zero prediction:</a:t>
+            </a:r>
+          </a:p>
+          <a:p>
+            <a:pPr marL="0" indent="0">
+              <a:buNone/>
+            </a:pPr>
+            <a:r>
+              <a:rPr lang="en-US" dirty="0"/>
+              <a:t>   MSE delta%: 2369.23 %</a:t>
+            </a:r>
+          </a:p>
+          <a:p>
+            <a:pPr marL="0" indent="0">
+              <a:buNone/>
+            </a:pPr>
+            <a:r>
+              <a:rPr lang="en-US" dirty="0"/>
+              <a:t>   RMSE delta%: 484.57 %</a:t>
+            </a:r>
+          </a:p>
+        </p:txBody>
+      </p:sp>
+    </p:spTree>
+    <p:extLst>
+      <p:ext uri="{BB962C8B-B14F-4D97-AF65-F5344CB8AC3E}">
+        <p14:creationId xmlns:p14="http://schemas.microsoft.com/office/powerpoint/2010/main" val="2649877789"/>
+      </p:ext>
+    </p:extLst>
+  </p:cSld>
+  <p:clrMapOvr>
+    <a:masterClrMapping/>
+  </p:clrMapOvr>
+</p:sld>
+</file>
+
 <file path=ppt/slides/slide2.xml><?xml version="1.0" encoding="utf-8"?>
 <p:sld xmlns:a="http://schemas.openxmlformats.org/drawingml/2006/main" xmlns:r="http://schemas.openxmlformats.org/officeDocument/2006/relationships" xmlns:p="http://schemas.openxmlformats.org/presentationml/2006/main">
   <p:cSld>
@@ -3438,6 +3842,98 @@
       </p:grpSpPr>
       <p:sp>
         <p:nvSpPr>
+          <p:cNvPr id="2" name="Title 1">
+            <a:extLst>
+              <a:ext uri="{FF2B5EF4-FFF2-40B4-BE49-F238E27FC236}">
+                <a16:creationId xmlns:a16="http://schemas.microsoft.com/office/drawing/2014/main" id="{DAB5A270-F30A-4789-BEE0-9BA9ECAA4CBA}"/>
+              </a:ext>
+            </a:extLst>
+          </p:cNvPr>
+          <p:cNvSpPr>
+            <a:spLocks noGrp="1"/>
+          </p:cNvSpPr>
+          <p:nvPr>
+            <p:ph type="ctrTitle"/>
+          </p:nvPr>
+        </p:nvSpPr>
+        <p:spPr/>
+        <p:txBody>
+          <a:bodyPr/>
+          <a:lstStyle/>
+          <a:p>
+            <a:r>
+              <a:rPr lang="nl-BE" dirty="0"/>
+              <a:t>LSTM </a:t>
+            </a:r>
+            <a:r>
+              <a:rPr lang="nl-BE" dirty="0" err="1"/>
+              <a:t>sequence</a:t>
+            </a:r>
+            <a:r>
+              <a:rPr lang="nl-BE" dirty="0"/>
+              <a:t> PR</a:t>
+            </a:r>
+            <a:endParaRPr lang="en-US" dirty="0"/>
+          </a:p>
+        </p:txBody>
+      </p:sp>
+      <p:sp>
+        <p:nvSpPr>
+          <p:cNvPr id="3" name="Subtitle 2">
+            <a:extLst>
+              <a:ext uri="{FF2B5EF4-FFF2-40B4-BE49-F238E27FC236}">
+                <a16:creationId xmlns:a16="http://schemas.microsoft.com/office/drawing/2014/main" id="{3CA55584-68DC-4257-AF5A-3442BF52779A}"/>
+              </a:ext>
+            </a:extLst>
+          </p:cNvPr>
+          <p:cNvSpPr>
+            <a:spLocks noGrp="1"/>
+          </p:cNvSpPr>
+          <p:nvPr>
+            <p:ph type="subTitle" idx="1"/>
+          </p:nvPr>
+        </p:nvSpPr>
+        <p:spPr/>
+        <p:txBody>
+          <a:bodyPr/>
+          <a:lstStyle/>
+          <a:p>
+            <a:endParaRPr lang="en-US" dirty="0"/>
+          </a:p>
+        </p:txBody>
+      </p:sp>
+    </p:spTree>
+    <p:extLst>
+      <p:ext uri="{BB962C8B-B14F-4D97-AF65-F5344CB8AC3E}">
+        <p14:creationId xmlns:p14="http://schemas.microsoft.com/office/powerpoint/2010/main" val="1791640763"/>
+      </p:ext>
+    </p:extLst>
+  </p:cSld>
+  <p:clrMapOvr>
+    <a:masterClrMapping/>
+  </p:clrMapOvr>
+</p:sld>
+</file>
+
+<file path=ppt/slides/slide3.xml><?xml version="1.0" encoding="utf-8"?>
+<p:sld xmlns:a="http://schemas.openxmlformats.org/drawingml/2006/main" xmlns:r="http://schemas.openxmlformats.org/officeDocument/2006/relationships" xmlns:p="http://schemas.openxmlformats.org/presentationml/2006/main">
+  <p:cSld>
+    <p:spTree>
+      <p:nvGrpSpPr>
+        <p:cNvPr id="1" name=""/>
+        <p:cNvGrpSpPr/>
+        <p:nvPr/>
+      </p:nvGrpSpPr>
+      <p:grpSpPr>
+        <a:xfrm>
+          <a:off x="0" y="0"/>
+          <a:ext cx="0" cy="0"/>
+          <a:chOff x="0" y="0"/>
+          <a:chExt cx="0" cy="0"/>
+        </a:xfrm>
+      </p:grpSpPr>
+      <p:sp>
+        <p:nvSpPr>
           <p:cNvPr id="2" name="Titel 1">
             <a:extLst>
               <a:ext uri="{FF2B5EF4-FFF2-40B4-BE49-F238E27FC236}">
@@ -3537,7 +4033,7 @@
 </p:sld>
 </file>
 
-<file path=ppt/slides/slide3.xml><?xml version="1.0" encoding="utf-8"?>
+<file path=ppt/slides/slide4.xml><?xml version="1.0" encoding="utf-8"?>
 <p:sld xmlns:a="http://schemas.openxmlformats.org/drawingml/2006/main" xmlns:r="http://schemas.openxmlformats.org/officeDocument/2006/relationships" xmlns:p="http://schemas.openxmlformats.org/presentationml/2006/main">
   <p:cSld>
     <p:spTree>
@@ -3993,230 +4489,6 @@
 </p:sld>
 </file>
 
-<file path=ppt/slides/slide4.xml><?xml version="1.0" encoding="utf-8"?>
-<p:sld xmlns:a="http://schemas.openxmlformats.org/drawingml/2006/main" xmlns:r="http://schemas.openxmlformats.org/officeDocument/2006/relationships" xmlns:p="http://schemas.openxmlformats.org/presentationml/2006/main">
-  <p:cSld>
-    <p:spTree>
-      <p:nvGrpSpPr>
-        <p:cNvPr id="1" name=""/>
-        <p:cNvGrpSpPr/>
-        <p:nvPr/>
-      </p:nvGrpSpPr>
-      <p:grpSpPr>
-        <a:xfrm>
-          <a:off x="0" y="0"/>
-          <a:ext cx="0" cy="0"/>
-          <a:chOff x="0" y="0"/>
-          <a:chExt cx="0" cy="0"/>
-        </a:xfrm>
-      </p:grpSpPr>
-      <p:sp>
-        <p:nvSpPr>
-          <p:cNvPr id="2" name="Titel 1">
-            <a:extLst>
-              <a:ext uri="{FF2B5EF4-FFF2-40B4-BE49-F238E27FC236}">
-                <a16:creationId xmlns:a16="http://schemas.microsoft.com/office/drawing/2014/main" id="{E1883FB0-08B7-49AA-9C3F-5A04417A7AEA}"/>
-              </a:ext>
-            </a:extLst>
-          </p:cNvPr>
-          <p:cNvSpPr>
-            <a:spLocks noGrp="1"/>
-          </p:cNvSpPr>
-          <p:nvPr>
-            <p:ph type="title"/>
-          </p:nvPr>
-        </p:nvSpPr>
-        <p:spPr/>
-        <p:txBody>
-          <a:bodyPr/>
-          <a:lstStyle/>
-          <a:p>
-            <a:r>
-              <a:rPr lang="nl-BE" dirty="0"/>
-              <a:t>Pitch 8 </a:t>
-            </a:r>
-            <a:r>
-              <a:rPr lang="nl-BE" dirty="0" err="1"/>
-              <a:t>epochs</a:t>
-            </a:r>
-            <a:endParaRPr lang="nl-BE" dirty="0"/>
-          </a:p>
-        </p:txBody>
-      </p:sp>
-      <p:sp>
-        <p:nvSpPr>
-          <p:cNvPr id="3" name="Tijdelijke aanduiding voor inhoud 2">
-            <a:extLst>
-              <a:ext uri="{FF2B5EF4-FFF2-40B4-BE49-F238E27FC236}">
-                <a16:creationId xmlns:a16="http://schemas.microsoft.com/office/drawing/2014/main" id="{F53AEA68-6534-49C7-83EC-307E6858B6CB}"/>
-              </a:ext>
-            </a:extLst>
-          </p:cNvPr>
-          <p:cNvSpPr>
-            <a:spLocks noGrp="1"/>
-          </p:cNvSpPr>
-          <p:nvPr>
-            <p:ph idx="1"/>
-          </p:nvPr>
-        </p:nvSpPr>
-        <p:spPr/>
-        <p:txBody>
-          <a:bodyPr>
-            <a:normAutofit fontScale="85000" lnSpcReduction="20000"/>
-          </a:bodyPr>
-          <a:lstStyle/>
-          <a:p>
-            <a:pPr marL="0" indent="0">
-              <a:buNone/>
-            </a:pPr>
-            <a:r>
-              <a:rPr lang="nl-BE" dirty="0"/>
-              <a:t>Real </a:t>
-            </a:r>
-            <a:r>
-              <a:rPr lang="nl-BE" dirty="0" err="1"/>
-              <a:t>prediction</a:t>
-            </a:r>
-            <a:endParaRPr lang="nl-BE" dirty="0"/>
-          </a:p>
-          <a:p>
-            <a:pPr marL="0" indent="0">
-              <a:buNone/>
-            </a:pPr>
-            <a:r>
-              <a:rPr lang="nl-BE" dirty="0"/>
-              <a:t>   MSE: 0.00139</a:t>
-            </a:r>
-          </a:p>
-          <a:p>
-            <a:pPr marL="0" indent="0">
-              <a:buNone/>
-            </a:pPr>
-            <a:r>
-              <a:rPr lang="nl-BE" dirty="0"/>
-              <a:t>   RMSE: 0.0373</a:t>
-            </a:r>
-          </a:p>
-          <a:p>
-            <a:pPr marL="0" indent="0">
-              <a:buNone/>
-            </a:pPr>
-            <a:r>
-              <a:rPr lang="nl-BE" dirty="0"/>
-              <a:t>   RMSE </a:t>
-            </a:r>
-            <a:r>
-              <a:rPr lang="nl-BE" dirty="0" err="1"/>
-              <a:t>denorm</a:t>
-            </a:r>
-            <a:r>
-              <a:rPr lang="nl-BE" dirty="0"/>
-              <a:t>: 3.36°</a:t>
-            </a:r>
-          </a:p>
-          <a:p>
-            <a:pPr marL="0" indent="0">
-              <a:buNone/>
-            </a:pPr>
-            <a:r>
-              <a:rPr lang="nl-BE" dirty="0"/>
-              <a:t>Zero </a:t>
-            </a:r>
-            <a:r>
-              <a:rPr lang="nl-BE" dirty="0" err="1"/>
-              <a:t>prediction</a:t>
-            </a:r>
-            <a:endParaRPr lang="nl-BE" dirty="0"/>
-          </a:p>
-          <a:p>
-            <a:pPr marL="0" indent="0">
-              <a:buNone/>
-            </a:pPr>
-            <a:r>
-              <a:rPr lang="nl-BE" dirty="0"/>
-              <a:t>   MSE 0: 0.00513</a:t>
-            </a:r>
-          </a:p>
-          <a:p>
-            <a:pPr marL="0" indent="0">
-              <a:buNone/>
-            </a:pPr>
-            <a:r>
-              <a:rPr lang="nl-BE" dirty="0"/>
-              <a:t>   RMSE 0: 0.0716</a:t>
-            </a:r>
-          </a:p>
-          <a:p>
-            <a:pPr marL="0" indent="0">
-              <a:buNone/>
-            </a:pPr>
-            <a:r>
-              <a:rPr lang="nl-BE" dirty="0"/>
-              <a:t>   RMSE </a:t>
-            </a:r>
-            <a:r>
-              <a:rPr lang="nl-BE" dirty="0" err="1"/>
-              <a:t>denorm</a:t>
-            </a:r>
-            <a:r>
-              <a:rPr lang="nl-BE" dirty="0"/>
-              <a:t>: 6.44°</a:t>
-            </a:r>
-          </a:p>
-          <a:p>
-            <a:pPr marL="0" indent="0">
-              <a:buNone/>
-            </a:pPr>
-            <a:r>
-              <a:rPr lang="nl-BE" dirty="0" err="1"/>
-              <a:t>Improvement</a:t>
-            </a:r>
-            <a:r>
-              <a:rPr lang="nl-BE" dirty="0"/>
-              <a:t> on zero </a:t>
-            </a:r>
-            <a:r>
-              <a:rPr lang="nl-BE" dirty="0" err="1"/>
-              <a:t>prediction</a:t>
-            </a:r>
-            <a:r>
-              <a:rPr lang="nl-BE" dirty="0"/>
-              <a:t>:</a:t>
-            </a:r>
-          </a:p>
-          <a:p>
-            <a:pPr marL="0" indent="0">
-              <a:buNone/>
-            </a:pPr>
-            <a:r>
-              <a:rPr lang="nl-BE" dirty="0"/>
-              <a:t>   MSE delta%: 369.06 %</a:t>
-            </a:r>
-          </a:p>
-          <a:p>
-            <a:pPr marL="0" indent="0">
-              <a:buNone/>
-            </a:pPr>
-            <a:r>
-              <a:rPr lang="nl-BE" dirty="0"/>
-              <a:t>   RMSE delta%: 191.96 %</a:t>
-            </a:r>
-          </a:p>
-        </p:txBody>
-      </p:sp>
-    </p:spTree>
-    <p:extLst>
-      <p:ext uri="{BB962C8B-B14F-4D97-AF65-F5344CB8AC3E}">
-        <p14:creationId xmlns:p14="http://schemas.microsoft.com/office/powerpoint/2010/main" val="709360002"/>
-      </p:ext>
-    </p:extLst>
-  </p:cSld>
-  <p:clrMapOvr>
-    <a:masterClrMapping/>
-  </p:clrMapOvr>
-</p:sld>
-</file>
-
 <file path=ppt/slides/slide5.xml><?xml version="1.0" encoding="utf-8"?>
 <p:sld xmlns:a="http://schemas.openxmlformats.org/drawingml/2006/main" xmlns:r="http://schemas.openxmlformats.org/officeDocument/2006/relationships" xmlns:p="http://schemas.openxmlformats.org/presentationml/2006/main">
   <p:cSld>
@@ -4257,7 +4529,7 @@
           <a:p>
             <a:r>
               <a:rPr lang="nl-BE" dirty="0"/>
-              <a:t>Pitch 50 </a:t>
+              <a:t>Pitch 8 </a:t>
             </a:r>
             <a:r>
               <a:rPr lang="nl-BE" dirty="0" err="1"/>
@@ -4295,7 +4567,7 @@
             </a:pPr>
             <a:r>
               <a:rPr lang="nl-BE" dirty="0"/>
-              <a:t>Pitch </a:t>
+              <a:t>Real </a:t>
             </a:r>
             <a:r>
               <a:rPr lang="nl-BE" dirty="0" err="1"/>
@@ -4309,16 +4581,16 @@
             </a:pPr>
             <a:r>
               <a:rPr lang="nl-BE" dirty="0"/>
-              <a:t>   MSE: 0.00061</a:t>
-            </a:r>
-          </a:p>
-          <a:p>
-            <a:pPr marL="0" indent="0">
-              <a:buNone/>
-            </a:pPr>
-            <a:r>
-              <a:rPr lang="nl-BE" dirty="0"/>
-              <a:t>   RMSE: 0.0248</a:t>
+              <a:t>   MSE: 0.00139</a:t>
+            </a:r>
+          </a:p>
+          <a:p>
+            <a:pPr marL="0" indent="0">
+              <a:buNone/>
+            </a:pPr>
+            <a:r>
+              <a:rPr lang="nl-BE" dirty="0"/>
+              <a:t>   RMSE: 0.0373</a:t>
             </a:r>
           </a:p>
           <a:p>
@@ -4335,7 +4607,7 @@
             </a:r>
             <a:r>
               <a:rPr lang="nl-BE" dirty="0"/>
-              <a:t>: 2.23°</a:t>
+              <a:t>: 3.36°</a:t>
             </a:r>
           </a:p>
           <a:p>
@@ -4414,16 +4686,16 @@
             </a:pPr>
             <a:r>
               <a:rPr lang="nl-BE" dirty="0"/>
-              <a:t>   MSE delta%: 840.98 %</a:t>
-            </a:r>
-          </a:p>
-          <a:p>
-            <a:pPr marL="0" indent="0">
-              <a:buNone/>
-            </a:pPr>
-            <a:r>
-              <a:rPr lang="nl-BE" dirty="0"/>
-              <a:t>   RMSE delta%: 288.71 %</a:t>
+              <a:t>   MSE delta%: 369.06 %</a:t>
+            </a:r>
+          </a:p>
+          <a:p>
+            <a:pPr marL="0" indent="0">
+              <a:buNone/>
+            </a:pPr>
+            <a:r>
+              <a:rPr lang="nl-BE" dirty="0"/>
+              <a:t>   RMSE delta%: 191.96 %</a:t>
             </a:r>
           </a:p>
         </p:txBody>
@@ -4431,7 +4703,7 @@
     </p:spTree>
     <p:extLst>
       <p:ext uri="{BB962C8B-B14F-4D97-AF65-F5344CB8AC3E}">
-        <p14:creationId xmlns:p14="http://schemas.microsoft.com/office/powerpoint/2010/main" val="352239956"/>
+        <p14:creationId xmlns:p14="http://schemas.microsoft.com/office/powerpoint/2010/main" val="709360002"/>
       </p:ext>
     </p:extLst>
   </p:cSld>
@@ -4463,7 +4735,7 @@
           <p:cNvPr id="2" name="Titel 1">
             <a:extLst>
               <a:ext uri="{FF2B5EF4-FFF2-40B4-BE49-F238E27FC236}">
-                <a16:creationId xmlns:a16="http://schemas.microsoft.com/office/drawing/2014/main" id="{BD745513-1078-4511-B09A-7591AD4858C2}"/>
+                <a16:creationId xmlns:a16="http://schemas.microsoft.com/office/drawing/2014/main" id="{E1883FB0-08B7-49AA-9C3F-5A04417A7AEA}"/>
               </a:ext>
             </a:extLst>
           </p:cNvPr>
@@ -4480,12 +4752,8 @@
           <a:lstStyle/>
           <a:p>
             <a:r>
-              <a:rPr lang="nl-BE" dirty="0" err="1"/>
-              <a:t>Roll</a:t>
-            </a:r>
-            <a:r>
-              <a:rPr lang="nl-BE" dirty="0"/>
-              <a:t> 8 </a:t>
+              <a:rPr lang="nl-BE" dirty="0"/>
+              <a:t>Pitch 50 </a:t>
             </a:r>
             <a:r>
               <a:rPr lang="nl-BE" dirty="0" err="1"/>
@@ -4500,7 +4768,7 @@
           <p:cNvPr id="3" name="Tijdelijke aanduiding voor inhoud 2">
             <a:extLst>
               <a:ext uri="{FF2B5EF4-FFF2-40B4-BE49-F238E27FC236}">
-                <a16:creationId xmlns:a16="http://schemas.microsoft.com/office/drawing/2014/main" id="{9852C49B-AAB4-47A8-B295-E8FE617FD2A7}"/>
+                <a16:creationId xmlns:a16="http://schemas.microsoft.com/office/drawing/2014/main" id="{F53AEA68-6534-49C7-83EC-307E6858B6CB}"/>
               </a:ext>
             </a:extLst>
           </p:cNvPr>
@@ -4523,7 +4791,7 @@
             </a:pPr>
             <a:r>
               <a:rPr lang="nl-BE" dirty="0"/>
-              <a:t>Real </a:t>
+              <a:t>Pitch </a:t>
             </a:r>
             <a:r>
               <a:rPr lang="nl-BE" dirty="0" err="1"/>
@@ -4537,16 +4805,16 @@
             </a:pPr>
             <a:r>
               <a:rPr lang="nl-BE" dirty="0"/>
-              <a:t>   MSE: 0.00107</a:t>
-            </a:r>
-          </a:p>
-          <a:p>
-            <a:pPr marL="0" indent="0">
-              <a:buNone/>
-            </a:pPr>
-            <a:r>
-              <a:rPr lang="nl-BE" dirty="0"/>
-              <a:t>   RMSE: 0.0327</a:t>
+              <a:t>   MSE: 0.00061</a:t>
+            </a:r>
+          </a:p>
+          <a:p>
+            <a:pPr marL="0" indent="0">
+              <a:buNone/>
+            </a:pPr>
+            <a:r>
+              <a:rPr lang="nl-BE" dirty="0"/>
+              <a:t>   RMSE: 0.0248</a:t>
             </a:r>
           </a:p>
           <a:p>
@@ -4563,7 +4831,7 @@
             </a:r>
             <a:r>
               <a:rPr lang="nl-BE" dirty="0"/>
-              <a:t>: 2.94°</a:t>
+              <a:t>: 2.23°</a:t>
             </a:r>
           </a:p>
           <a:p>
@@ -4586,16 +4854,16 @@
             </a:pPr>
             <a:r>
               <a:rPr lang="nl-BE" dirty="0"/>
-              <a:t>   MSE 0: 0.00653</a:t>
-            </a:r>
-          </a:p>
-          <a:p>
-            <a:pPr marL="0" indent="0">
-              <a:buNone/>
-            </a:pPr>
-            <a:r>
-              <a:rPr lang="nl-BE" dirty="0"/>
-              <a:t>   RMSE 0: 0.0808</a:t>
+              <a:t>   MSE 0: 0.00513</a:t>
+            </a:r>
+          </a:p>
+          <a:p>
+            <a:pPr marL="0" indent="0">
+              <a:buNone/>
+            </a:pPr>
+            <a:r>
+              <a:rPr lang="nl-BE" dirty="0"/>
+              <a:t>   RMSE 0: 0.0716</a:t>
             </a:r>
           </a:p>
           <a:p>
@@ -4612,7 +4880,7 @@
             </a:r>
             <a:r>
               <a:rPr lang="nl-BE" dirty="0"/>
-              <a:t>: 7.27°</a:t>
+              <a:t>: 6.44°</a:t>
             </a:r>
           </a:p>
           <a:p>
@@ -4642,16 +4910,16 @@
             </a:pPr>
             <a:r>
               <a:rPr lang="nl-BE" dirty="0"/>
-              <a:t>   MSE delta%: 610.28 %</a:t>
-            </a:r>
-          </a:p>
-          <a:p>
-            <a:pPr marL="0" indent="0">
-              <a:buNone/>
-            </a:pPr>
-            <a:r>
-              <a:rPr lang="nl-BE" dirty="0"/>
-              <a:t>   RMSE delta%: 247.09 %</a:t>
+              <a:t>   MSE delta%: 840.98 %</a:t>
+            </a:r>
+          </a:p>
+          <a:p>
+            <a:pPr marL="0" indent="0">
+              <a:buNone/>
+            </a:pPr>
+            <a:r>
+              <a:rPr lang="nl-BE" dirty="0"/>
+              <a:t>   RMSE delta%: 288.71 %</a:t>
             </a:r>
           </a:p>
         </p:txBody>
@@ -4659,7 +4927,7 @@
     </p:spTree>
     <p:extLst>
       <p:ext uri="{BB962C8B-B14F-4D97-AF65-F5344CB8AC3E}">
-        <p14:creationId xmlns:p14="http://schemas.microsoft.com/office/powerpoint/2010/main" val="366614722"/>
+        <p14:creationId xmlns:p14="http://schemas.microsoft.com/office/powerpoint/2010/main" val="352239956"/>
       </p:ext>
     </p:extLst>
   </p:cSld>
@@ -4713,6 +4981,234 @@
             </a:r>
             <a:r>
               <a:rPr lang="nl-BE" dirty="0"/>
+              <a:t> 8 </a:t>
+            </a:r>
+            <a:r>
+              <a:rPr lang="nl-BE" dirty="0" err="1"/>
+              <a:t>epochs</a:t>
+            </a:r>
+            <a:endParaRPr lang="nl-BE" dirty="0"/>
+          </a:p>
+        </p:txBody>
+      </p:sp>
+      <p:sp>
+        <p:nvSpPr>
+          <p:cNvPr id="3" name="Tijdelijke aanduiding voor inhoud 2">
+            <a:extLst>
+              <a:ext uri="{FF2B5EF4-FFF2-40B4-BE49-F238E27FC236}">
+                <a16:creationId xmlns:a16="http://schemas.microsoft.com/office/drawing/2014/main" id="{9852C49B-AAB4-47A8-B295-E8FE617FD2A7}"/>
+              </a:ext>
+            </a:extLst>
+          </p:cNvPr>
+          <p:cNvSpPr>
+            <a:spLocks noGrp="1"/>
+          </p:cNvSpPr>
+          <p:nvPr>
+            <p:ph idx="1"/>
+          </p:nvPr>
+        </p:nvSpPr>
+        <p:spPr/>
+        <p:txBody>
+          <a:bodyPr>
+            <a:normAutofit fontScale="85000" lnSpcReduction="20000"/>
+          </a:bodyPr>
+          <a:lstStyle/>
+          <a:p>
+            <a:pPr marL="0" indent="0">
+              <a:buNone/>
+            </a:pPr>
+            <a:r>
+              <a:rPr lang="nl-BE" dirty="0"/>
+              <a:t>Real </a:t>
+            </a:r>
+            <a:r>
+              <a:rPr lang="nl-BE" dirty="0" err="1"/>
+              <a:t>prediction</a:t>
+            </a:r>
+            <a:endParaRPr lang="nl-BE" dirty="0"/>
+          </a:p>
+          <a:p>
+            <a:pPr marL="0" indent="0">
+              <a:buNone/>
+            </a:pPr>
+            <a:r>
+              <a:rPr lang="nl-BE" dirty="0"/>
+              <a:t>   MSE: 0.00107</a:t>
+            </a:r>
+          </a:p>
+          <a:p>
+            <a:pPr marL="0" indent="0">
+              <a:buNone/>
+            </a:pPr>
+            <a:r>
+              <a:rPr lang="nl-BE" dirty="0"/>
+              <a:t>   RMSE: 0.0327</a:t>
+            </a:r>
+          </a:p>
+          <a:p>
+            <a:pPr marL="0" indent="0">
+              <a:buNone/>
+            </a:pPr>
+            <a:r>
+              <a:rPr lang="nl-BE" dirty="0"/>
+              <a:t>   RMSE </a:t>
+            </a:r>
+            <a:r>
+              <a:rPr lang="nl-BE" dirty="0" err="1"/>
+              <a:t>denorm</a:t>
+            </a:r>
+            <a:r>
+              <a:rPr lang="nl-BE" dirty="0"/>
+              <a:t>: 2.94°</a:t>
+            </a:r>
+          </a:p>
+          <a:p>
+            <a:pPr marL="0" indent="0">
+              <a:buNone/>
+            </a:pPr>
+            <a:r>
+              <a:rPr lang="nl-BE" dirty="0"/>
+              <a:t>Zero </a:t>
+            </a:r>
+            <a:r>
+              <a:rPr lang="nl-BE" dirty="0" err="1"/>
+              <a:t>prediction</a:t>
+            </a:r>
+            <a:endParaRPr lang="nl-BE" dirty="0"/>
+          </a:p>
+          <a:p>
+            <a:pPr marL="0" indent="0">
+              <a:buNone/>
+            </a:pPr>
+            <a:r>
+              <a:rPr lang="nl-BE" dirty="0"/>
+              <a:t>   MSE 0: 0.00653</a:t>
+            </a:r>
+          </a:p>
+          <a:p>
+            <a:pPr marL="0" indent="0">
+              <a:buNone/>
+            </a:pPr>
+            <a:r>
+              <a:rPr lang="nl-BE" dirty="0"/>
+              <a:t>   RMSE 0: 0.0808</a:t>
+            </a:r>
+          </a:p>
+          <a:p>
+            <a:pPr marL="0" indent="0">
+              <a:buNone/>
+            </a:pPr>
+            <a:r>
+              <a:rPr lang="nl-BE" dirty="0"/>
+              <a:t>   RMSE </a:t>
+            </a:r>
+            <a:r>
+              <a:rPr lang="nl-BE" dirty="0" err="1"/>
+              <a:t>denorm</a:t>
+            </a:r>
+            <a:r>
+              <a:rPr lang="nl-BE" dirty="0"/>
+              <a:t>: 7.27°</a:t>
+            </a:r>
+          </a:p>
+          <a:p>
+            <a:pPr marL="0" indent="0">
+              <a:buNone/>
+            </a:pPr>
+            <a:r>
+              <a:rPr lang="nl-BE" dirty="0" err="1"/>
+              <a:t>Improvement</a:t>
+            </a:r>
+            <a:r>
+              <a:rPr lang="nl-BE" dirty="0"/>
+              <a:t> on zero </a:t>
+            </a:r>
+            <a:r>
+              <a:rPr lang="nl-BE" dirty="0" err="1"/>
+              <a:t>prediction</a:t>
+            </a:r>
+            <a:r>
+              <a:rPr lang="nl-BE" dirty="0"/>
+              <a:t>:</a:t>
+            </a:r>
+          </a:p>
+          <a:p>
+            <a:pPr marL="0" indent="0">
+              <a:buNone/>
+            </a:pPr>
+            <a:r>
+              <a:rPr lang="nl-BE" dirty="0"/>
+              <a:t>   MSE delta%: 610.28 %</a:t>
+            </a:r>
+          </a:p>
+          <a:p>
+            <a:pPr marL="0" indent="0">
+              <a:buNone/>
+            </a:pPr>
+            <a:r>
+              <a:rPr lang="nl-BE" dirty="0"/>
+              <a:t>   RMSE delta%: 247.09 %</a:t>
+            </a:r>
+          </a:p>
+        </p:txBody>
+      </p:sp>
+    </p:spTree>
+    <p:extLst>
+      <p:ext uri="{BB962C8B-B14F-4D97-AF65-F5344CB8AC3E}">
+        <p14:creationId xmlns:p14="http://schemas.microsoft.com/office/powerpoint/2010/main" val="366614722"/>
+      </p:ext>
+    </p:extLst>
+  </p:cSld>
+  <p:clrMapOvr>
+    <a:masterClrMapping/>
+  </p:clrMapOvr>
+</p:sld>
+</file>
+
+<file path=ppt/slides/slide8.xml><?xml version="1.0" encoding="utf-8"?>
+<p:sld xmlns:a="http://schemas.openxmlformats.org/drawingml/2006/main" xmlns:r="http://schemas.openxmlformats.org/officeDocument/2006/relationships" xmlns:p="http://schemas.openxmlformats.org/presentationml/2006/main">
+  <p:cSld>
+    <p:spTree>
+      <p:nvGrpSpPr>
+        <p:cNvPr id="1" name=""/>
+        <p:cNvGrpSpPr/>
+        <p:nvPr/>
+      </p:nvGrpSpPr>
+      <p:grpSpPr>
+        <a:xfrm>
+          <a:off x="0" y="0"/>
+          <a:ext cx="0" cy="0"/>
+          <a:chOff x="0" y="0"/>
+          <a:chExt cx="0" cy="0"/>
+        </a:xfrm>
+      </p:grpSpPr>
+      <p:sp>
+        <p:nvSpPr>
+          <p:cNvPr id="2" name="Titel 1">
+            <a:extLst>
+              <a:ext uri="{FF2B5EF4-FFF2-40B4-BE49-F238E27FC236}">
+                <a16:creationId xmlns:a16="http://schemas.microsoft.com/office/drawing/2014/main" id="{BD745513-1078-4511-B09A-7591AD4858C2}"/>
+              </a:ext>
+            </a:extLst>
+          </p:cNvPr>
+          <p:cNvSpPr>
+            <a:spLocks noGrp="1"/>
+          </p:cNvSpPr>
+          <p:nvPr>
+            <p:ph type="title"/>
+          </p:nvPr>
+        </p:nvSpPr>
+        <p:spPr/>
+        <p:txBody>
+          <a:bodyPr/>
+          <a:lstStyle/>
+          <a:p>
+            <a:r>
+              <a:rPr lang="nl-BE" dirty="0" err="1"/>
+              <a:t>Roll</a:t>
+            </a:r>
+            <a:r>
+              <a:rPr lang="nl-BE" dirty="0"/>
               <a:t> 50 </a:t>
             </a:r>
             <a:r>
@@ -4892,6 +5388,90 @@
     <p:extLst>
       <p:ext uri="{BB962C8B-B14F-4D97-AF65-F5344CB8AC3E}">
         <p14:creationId xmlns:p14="http://schemas.microsoft.com/office/powerpoint/2010/main" val="3517077887"/>
+      </p:ext>
+    </p:extLst>
+  </p:cSld>
+  <p:clrMapOvr>
+    <a:masterClrMapping/>
+  </p:clrMapOvr>
+</p:sld>
+</file>
+
+<file path=ppt/slides/slide9.xml><?xml version="1.0" encoding="utf-8"?>
+<p:sld xmlns:a="http://schemas.openxmlformats.org/drawingml/2006/main" xmlns:r="http://schemas.openxmlformats.org/officeDocument/2006/relationships" xmlns:p="http://schemas.openxmlformats.org/presentationml/2006/main">
+  <p:cSld>
+    <p:spTree>
+      <p:nvGrpSpPr>
+        <p:cNvPr id="1" name=""/>
+        <p:cNvGrpSpPr/>
+        <p:nvPr/>
+      </p:nvGrpSpPr>
+      <p:grpSpPr>
+        <a:xfrm>
+          <a:off x="0" y="0"/>
+          <a:ext cx="0" cy="0"/>
+          <a:chOff x="0" y="0"/>
+          <a:chExt cx="0" cy="0"/>
+        </a:xfrm>
+      </p:grpSpPr>
+      <p:sp>
+        <p:nvSpPr>
+          <p:cNvPr id="2" name="Title 1">
+            <a:extLst>
+              <a:ext uri="{FF2B5EF4-FFF2-40B4-BE49-F238E27FC236}">
+                <a16:creationId xmlns:a16="http://schemas.microsoft.com/office/drawing/2014/main" id="{0AC3BA2F-E894-44BE-AE0C-DC1F042F6911}"/>
+              </a:ext>
+            </a:extLst>
+          </p:cNvPr>
+          <p:cNvSpPr>
+            <a:spLocks noGrp="1"/>
+          </p:cNvSpPr>
+          <p:nvPr>
+            <p:ph type="ctrTitle"/>
+          </p:nvPr>
+        </p:nvSpPr>
+        <p:spPr/>
+        <p:txBody>
+          <a:bodyPr/>
+          <a:lstStyle/>
+          <a:p>
+            <a:r>
+              <a:rPr lang="nl-BE" dirty="0"/>
+              <a:t>CNN LSTM</a:t>
+            </a:r>
+            <a:endParaRPr lang="en-US" dirty="0"/>
+          </a:p>
+        </p:txBody>
+      </p:sp>
+      <p:sp>
+        <p:nvSpPr>
+          <p:cNvPr id="3" name="Subtitle 2">
+            <a:extLst>
+              <a:ext uri="{FF2B5EF4-FFF2-40B4-BE49-F238E27FC236}">
+                <a16:creationId xmlns:a16="http://schemas.microsoft.com/office/drawing/2014/main" id="{F3FC7ABD-EB30-417A-800C-40F56AA019B5}"/>
+              </a:ext>
+            </a:extLst>
+          </p:cNvPr>
+          <p:cNvSpPr>
+            <a:spLocks noGrp="1"/>
+          </p:cNvSpPr>
+          <p:nvPr>
+            <p:ph type="subTitle" idx="1"/>
+          </p:nvPr>
+        </p:nvSpPr>
+        <p:spPr/>
+        <p:txBody>
+          <a:bodyPr/>
+          <a:lstStyle/>
+          <a:p>
+            <a:endParaRPr lang="en-US" dirty="0"/>
+          </a:p>
+        </p:txBody>
+      </p:sp>
+    </p:spTree>
+    <p:extLst>
+      <p:ext uri="{BB962C8B-B14F-4D97-AF65-F5344CB8AC3E}">
+        <p14:creationId xmlns:p14="http://schemas.microsoft.com/office/powerpoint/2010/main" val="2197275798"/>
       </p:ext>
     </p:extLst>
   </p:cSld>

</xml_diff>

<commit_message>
fixed issue with val loss and retraining
</commit_message>
<xml_diff>
--- a/Documentation/Presentations/Meeting 22-04-22.pptx
+++ b/Documentation/Presentations/Meeting 22-04-22.pptx
@@ -23,7 +23,8 @@
     <p:sldId id="280" r:id="rId17"/>
     <p:sldId id="265" r:id="rId18"/>
     <p:sldId id="266" r:id="rId19"/>
-    <p:sldId id="281" r:id="rId20"/>
+    <p:sldId id="282" r:id="rId20"/>
+    <p:sldId id="281" r:id="rId21"/>
   </p:sldIdLst>
   <p:sldSz cx="12192000" cy="6858000"/>
   <p:notesSz cx="6858000" cy="9144000"/>
@@ -3000,7 +3001,7 @@
           <a:p>
             <a:fld id="{7CB6E71D-8A23-499C-8B42-C5F5AD1CC328}" type="datetimeFigureOut">
               <a:rPr lang="nl-BE" smtClean="0"/>
-              <a:t>22/04/2022</a:t>
+              <a:t>29/04/2022</a:t>
             </a:fld>
             <a:endParaRPr lang="nl-BE"/>
           </a:p>
@@ -3054,7 +3055,7 @@
           <a:p>
             <a:fld id="{A7BD93BB-363D-4622-9583-19504A217089}" type="slidenum">
               <a:rPr lang="nl-BE" smtClean="0"/>
-              <a:t>‹nr.›</a:t>
+              <a:t>‹#›</a:t>
             </a:fld>
             <a:endParaRPr lang="nl-BE"/>
           </a:p>
@@ -3200,7 +3201,7 @@
           <a:p>
             <a:fld id="{7CB6E71D-8A23-499C-8B42-C5F5AD1CC328}" type="datetimeFigureOut">
               <a:rPr lang="nl-BE" smtClean="0"/>
-              <a:t>22/04/2022</a:t>
+              <a:t>29/04/2022</a:t>
             </a:fld>
             <a:endParaRPr lang="nl-BE"/>
           </a:p>
@@ -3254,7 +3255,7 @@
           <a:p>
             <a:fld id="{A7BD93BB-363D-4622-9583-19504A217089}" type="slidenum">
               <a:rPr lang="nl-BE" smtClean="0"/>
-              <a:t>‹nr.›</a:t>
+              <a:t>‹#›</a:t>
             </a:fld>
             <a:endParaRPr lang="nl-BE"/>
           </a:p>
@@ -3410,7 +3411,7 @@
           <a:p>
             <a:fld id="{7CB6E71D-8A23-499C-8B42-C5F5AD1CC328}" type="datetimeFigureOut">
               <a:rPr lang="nl-BE" smtClean="0"/>
-              <a:t>22/04/2022</a:t>
+              <a:t>29/04/2022</a:t>
             </a:fld>
             <a:endParaRPr lang="nl-BE"/>
           </a:p>
@@ -3464,7 +3465,7 @@
           <a:p>
             <a:fld id="{A7BD93BB-363D-4622-9583-19504A217089}" type="slidenum">
               <a:rPr lang="nl-BE" smtClean="0"/>
-              <a:t>‹nr.›</a:t>
+              <a:t>‹#›</a:t>
             </a:fld>
             <a:endParaRPr lang="nl-BE"/>
           </a:p>
@@ -3610,7 +3611,7 @@
           <a:p>
             <a:fld id="{7CB6E71D-8A23-499C-8B42-C5F5AD1CC328}" type="datetimeFigureOut">
               <a:rPr lang="nl-BE" smtClean="0"/>
-              <a:t>22/04/2022</a:t>
+              <a:t>29/04/2022</a:t>
             </a:fld>
             <a:endParaRPr lang="nl-BE"/>
           </a:p>
@@ -3664,7 +3665,7 @@
           <a:p>
             <a:fld id="{A7BD93BB-363D-4622-9583-19504A217089}" type="slidenum">
               <a:rPr lang="nl-BE" smtClean="0"/>
-              <a:t>‹nr.›</a:t>
+              <a:t>‹#›</a:t>
             </a:fld>
             <a:endParaRPr lang="nl-BE"/>
           </a:p>
@@ -3886,7 +3887,7 @@
           <a:p>
             <a:fld id="{7CB6E71D-8A23-499C-8B42-C5F5AD1CC328}" type="datetimeFigureOut">
               <a:rPr lang="nl-BE" smtClean="0"/>
-              <a:t>22/04/2022</a:t>
+              <a:t>29/04/2022</a:t>
             </a:fld>
             <a:endParaRPr lang="nl-BE"/>
           </a:p>
@@ -3940,7 +3941,7 @@
           <a:p>
             <a:fld id="{A7BD93BB-363D-4622-9583-19504A217089}" type="slidenum">
               <a:rPr lang="nl-BE" smtClean="0"/>
-              <a:t>‹nr.›</a:t>
+              <a:t>‹#›</a:t>
             </a:fld>
             <a:endParaRPr lang="nl-BE"/>
           </a:p>
@@ -4154,7 +4155,7 @@
           <a:p>
             <a:fld id="{7CB6E71D-8A23-499C-8B42-C5F5AD1CC328}" type="datetimeFigureOut">
               <a:rPr lang="nl-BE" smtClean="0"/>
-              <a:t>22/04/2022</a:t>
+              <a:t>29/04/2022</a:t>
             </a:fld>
             <a:endParaRPr lang="nl-BE"/>
           </a:p>
@@ -4208,7 +4209,7 @@
           <a:p>
             <a:fld id="{A7BD93BB-363D-4622-9583-19504A217089}" type="slidenum">
               <a:rPr lang="nl-BE" smtClean="0"/>
-              <a:t>‹nr.›</a:t>
+              <a:t>‹#›</a:t>
             </a:fld>
             <a:endParaRPr lang="nl-BE"/>
           </a:p>
@@ -4569,7 +4570,7 @@
           <a:p>
             <a:fld id="{7CB6E71D-8A23-499C-8B42-C5F5AD1CC328}" type="datetimeFigureOut">
               <a:rPr lang="nl-BE" smtClean="0"/>
-              <a:t>22/04/2022</a:t>
+              <a:t>29/04/2022</a:t>
             </a:fld>
             <a:endParaRPr lang="nl-BE"/>
           </a:p>
@@ -4623,7 +4624,7 @@
           <a:p>
             <a:fld id="{A7BD93BB-363D-4622-9583-19504A217089}" type="slidenum">
               <a:rPr lang="nl-BE" smtClean="0"/>
-              <a:t>‹nr.›</a:t>
+              <a:t>‹#›</a:t>
             </a:fld>
             <a:endParaRPr lang="nl-BE"/>
           </a:p>
@@ -4711,7 +4712,7 @@
           <a:p>
             <a:fld id="{7CB6E71D-8A23-499C-8B42-C5F5AD1CC328}" type="datetimeFigureOut">
               <a:rPr lang="nl-BE" smtClean="0"/>
-              <a:t>22/04/2022</a:t>
+              <a:t>29/04/2022</a:t>
             </a:fld>
             <a:endParaRPr lang="nl-BE"/>
           </a:p>
@@ -4765,7 +4766,7 @@
           <a:p>
             <a:fld id="{A7BD93BB-363D-4622-9583-19504A217089}" type="slidenum">
               <a:rPr lang="nl-BE" smtClean="0"/>
-              <a:t>‹nr.›</a:t>
+              <a:t>‹#›</a:t>
             </a:fld>
             <a:endParaRPr lang="nl-BE"/>
           </a:p>
@@ -4824,7 +4825,7 @@
           <a:p>
             <a:fld id="{7CB6E71D-8A23-499C-8B42-C5F5AD1CC328}" type="datetimeFigureOut">
               <a:rPr lang="nl-BE" smtClean="0"/>
-              <a:t>22/04/2022</a:t>
+              <a:t>29/04/2022</a:t>
             </a:fld>
             <a:endParaRPr lang="nl-BE"/>
           </a:p>
@@ -4878,7 +4879,7 @@
           <a:p>
             <a:fld id="{A7BD93BB-363D-4622-9583-19504A217089}" type="slidenum">
               <a:rPr lang="nl-BE" smtClean="0"/>
-              <a:t>‹nr.›</a:t>
+              <a:t>‹#›</a:t>
             </a:fld>
             <a:endParaRPr lang="nl-BE"/>
           </a:p>
@@ -5137,7 +5138,7 @@
           <a:p>
             <a:fld id="{7CB6E71D-8A23-499C-8B42-C5F5AD1CC328}" type="datetimeFigureOut">
               <a:rPr lang="nl-BE" smtClean="0"/>
-              <a:t>22/04/2022</a:t>
+              <a:t>29/04/2022</a:t>
             </a:fld>
             <a:endParaRPr lang="nl-BE"/>
           </a:p>
@@ -5191,7 +5192,7 @@
           <a:p>
             <a:fld id="{A7BD93BB-363D-4622-9583-19504A217089}" type="slidenum">
               <a:rPr lang="nl-BE" smtClean="0"/>
-              <a:t>‹nr.›</a:t>
+              <a:t>‹#›</a:t>
             </a:fld>
             <a:endParaRPr lang="nl-BE"/>
           </a:p>
@@ -5426,7 +5427,7 @@
           <a:p>
             <a:fld id="{7CB6E71D-8A23-499C-8B42-C5F5AD1CC328}" type="datetimeFigureOut">
               <a:rPr lang="nl-BE" smtClean="0"/>
-              <a:t>22/04/2022</a:t>
+              <a:t>29/04/2022</a:t>
             </a:fld>
             <a:endParaRPr lang="nl-BE"/>
           </a:p>
@@ -5480,7 +5481,7 @@
           <a:p>
             <a:fld id="{A7BD93BB-363D-4622-9583-19504A217089}" type="slidenum">
               <a:rPr lang="nl-BE" smtClean="0"/>
-              <a:t>‹nr.›</a:t>
+              <a:t>‹#›</a:t>
             </a:fld>
             <a:endParaRPr lang="nl-BE"/>
           </a:p>
@@ -5669,7 +5670,7 @@
           <a:p>
             <a:fld id="{7CB6E71D-8A23-499C-8B42-C5F5AD1CC328}" type="datetimeFigureOut">
               <a:rPr lang="nl-BE" smtClean="0"/>
-              <a:t>22/04/2022</a:t>
+              <a:t>29/04/2022</a:t>
             </a:fld>
             <a:endParaRPr lang="nl-BE"/>
           </a:p>
@@ -5759,7 +5760,7 @@
           <a:p>
             <a:fld id="{A7BD93BB-363D-4622-9583-19504A217089}" type="slidenum">
               <a:rPr lang="nl-BE" smtClean="0"/>
-              <a:t>‹nr.›</a:t>
+              <a:t>‹#›</a:t>
             </a:fld>
             <a:endParaRPr lang="nl-BE"/>
           </a:p>
@@ -11738,10 +11739,10 @@
       </p:grpSpPr>
       <p:sp>
         <p:nvSpPr>
-          <p:cNvPr id="2" name="Titel 1">
+          <p:cNvPr id="2" name="Title 1">
             <a:extLst>
               <a:ext uri="{FF2B5EF4-FFF2-40B4-BE49-F238E27FC236}">
-                <a16:creationId xmlns:a16="http://schemas.microsoft.com/office/drawing/2014/main" id="{FD5BB1A3-671C-4D8E-9574-BC291F637332}"/>
+                <a16:creationId xmlns:a16="http://schemas.microsoft.com/office/drawing/2014/main" id="{53B59AA2-D5A8-42F9-BAD5-D5E9B47B6453}"/>
               </a:ext>
             </a:extLst>
           </p:cNvPr>
@@ -11757,90 +11758,47 @@
           <a:bodyPr/>
           <a:lstStyle/>
           <a:p>
-            <a:endParaRPr lang="nl-BE" dirty="0"/>
+            <a:r>
+              <a:rPr lang="nl-NL" dirty="0" err="1"/>
+              <a:t>Results</a:t>
+            </a:r>
+            <a:endParaRPr lang="en-US" dirty="0"/>
           </a:p>
         </p:txBody>
       </p:sp>
-      <p:sp>
-        <p:nvSpPr>
-          <p:cNvPr id="3" name="Tijdelijke aanduiding voor inhoud 2">
+      <p:pic>
+        <p:nvPicPr>
+          <p:cNvPr id="5" name="Content Placeholder 4">
             <a:extLst>
               <a:ext uri="{FF2B5EF4-FFF2-40B4-BE49-F238E27FC236}">
-                <a16:creationId xmlns:a16="http://schemas.microsoft.com/office/drawing/2014/main" id="{46D20E91-93E6-4B34-B105-400C8449C5E4}"/>
+                <a16:creationId xmlns:a16="http://schemas.microsoft.com/office/drawing/2014/main" id="{66D39855-9671-4DF2-887E-A949FCE13118}"/>
               </a:ext>
             </a:extLst>
           </p:cNvPr>
-          <p:cNvSpPr>
-            <a:spLocks noGrp="1"/>
-          </p:cNvSpPr>
+          <p:cNvPicPr>
+            <a:picLocks noGrp="1" noChangeAspect="1"/>
+          </p:cNvPicPr>
           <p:nvPr>
             <p:ph idx="1"/>
           </p:nvPr>
-        </p:nvSpPr>
-        <p:spPr/>
-        <p:txBody>
-          <a:bodyPr/>
-          <a:lstStyle/>
-          <a:p>
-            <a:r>
-              <a:rPr lang="nl-BE" dirty="0" err="1"/>
-              <a:t>Inference</a:t>
-            </a:r>
-            <a:r>
-              <a:rPr lang="nl-BE" dirty="0"/>
-              <a:t> time </a:t>
-            </a:r>
-            <a:r>
-              <a:rPr lang="nl-BE" dirty="0" err="1"/>
-              <a:t>comparison</a:t>
-            </a:r>
-            <a:endParaRPr lang="nl-BE" dirty="0"/>
-          </a:p>
-          <a:p>
-            <a:r>
-              <a:rPr lang="nl-BE" dirty="0" err="1"/>
-              <a:t>Dubble</a:t>
-            </a:r>
-            <a:r>
-              <a:rPr lang="nl-BE" dirty="0"/>
-              <a:t> check </a:t>
-            </a:r>
-            <a:r>
-              <a:rPr lang="nl-BE" dirty="0" err="1"/>
-              <a:t>calculations</a:t>
-            </a:r>
-            <a:endParaRPr lang="nl-BE" dirty="0"/>
-          </a:p>
-          <a:p>
-            <a:r>
-              <a:rPr lang="nl-BE" dirty="0" err="1"/>
-              <a:t>Add</a:t>
-            </a:r>
-            <a:r>
-              <a:rPr lang="nl-BE" dirty="0"/>
-              <a:t> PR to input</a:t>
-            </a:r>
-          </a:p>
-          <a:p>
-            <a:r>
-              <a:rPr lang="nl-BE" dirty="0"/>
-              <a:t>New datasets: real and </a:t>
-            </a:r>
-            <a:r>
-              <a:rPr lang="nl-BE" dirty="0" err="1"/>
-              <a:t>simulated</a:t>
-            </a:r>
-            <a:endParaRPr lang="nl-BE"/>
-          </a:p>
-          <a:p>
-            <a:endParaRPr lang="nl-BE"/>
-          </a:p>
-        </p:txBody>
-      </p:sp>
+        </p:nvPicPr>
+        <p:blipFill>
+          <a:blip r:embed="rId2"/>
+          <a:stretch>
+            <a:fillRect/>
+          </a:stretch>
+        </p:blipFill>
+        <p:spPr>
+          <a:xfrm>
+            <a:off x="1526652" y="2623478"/>
+            <a:ext cx="9138696" cy="2755631"/>
+          </a:xfrm>
+        </p:spPr>
+      </p:pic>
     </p:spTree>
     <p:extLst>
       <p:ext uri="{BB962C8B-B14F-4D97-AF65-F5344CB8AC3E}">
-        <p14:creationId xmlns:p14="http://schemas.microsoft.com/office/powerpoint/2010/main" val="2732600996"/>
+        <p14:creationId xmlns:p14="http://schemas.microsoft.com/office/powerpoint/2010/main" val="3754554168"/>
       </p:ext>
     </p:extLst>
   </p:cSld>
@@ -11954,6 +11912,136 @@
     <p:extLst>
       <p:ext uri="{BB962C8B-B14F-4D97-AF65-F5344CB8AC3E}">
         <p14:creationId xmlns:p14="http://schemas.microsoft.com/office/powerpoint/2010/main" val="2010143066"/>
+      </p:ext>
+    </p:extLst>
+  </p:cSld>
+  <p:clrMapOvr>
+    <a:masterClrMapping/>
+  </p:clrMapOvr>
+</p:sld>
+</file>
+
+<file path=ppt/slides/slide20.xml><?xml version="1.0" encoding="utf-8"?>
+<p:sld xmlns:a="http://schemas.openxmlformats.org/drawingml/2006/main" xmlns:r="http://schemas.openxmlformats.org/officeDocument/2006/relationships" xmlns:p="http://schemas.openxmlformats.org/presentationml/2006/main">
+  <p:cSld>
+    <p:spTree>
+      <p:nvGrpSpPr>
+        <p:cNvPr id="1" name=""/>
+        <p:cNvGrpSpPr/>
+        <p:nvPr/>
+      </p:nvGrpSpPr>
+      <p:grpSpPr>
+        <a:xfrm>
+          <a:off x="0" y="0"/>
+          <a:ext cx="0" cy="0"/>
+          <a:chOff x="0" y="0"/>
+          <a:chExt cx="0" cy="0"/>
+        </a:xfrm>
+      </p:grpSpPr>
+      <p:sp>
+        <p:nvSpPr>
+          <p:cNvPr id="2" name="Titel 1">
+            <a:extLst>
+              <a:ext uri="{FF2B5EF4-FFF2-40B4-BE49-F238E27FC236}">
+                <a16:creationId xmlns:a16="http://schemas.microsoft.com/office/drawing/2014/main" id="{FD5BB1A3-671C-4D8E-9574-BC291F637332}"/>
+              </a:ext>
+            </a:extLst>
+          </p:cNvPr>
+          <p:cNvSpPr>
+            <a:spLocks noGrp="1"/>
+          </p:cNvSpPr>
+          <p:nvPr>
+            <p:ph type="title"/>
+          </p:nvPr>
+        </p:nvSpPr>
+        <p:spPr/>
+        <p:txBody>
+          <a:bodyPr/>
+          <a:lstStyle/>
+          <a:p>
+            <a:r>
+              <a:rPr lang="nl-BE" dirty="0"/>
+              <a:t>To Do</a:t>
+            </a:r>
+          </a:p>
+        </p:txBody>
+      </p:sp>
+      <p:sp>
+        <p:nvSpPr>
+          <p:cNvPr id="3" name="Tijdelijke aanduiding voor inhoud 2">
+            <a:extLst>
+              <a:ext uri="{FF2B5EF4-FFF2-40B4-BE49-F238E27FC236}">
+                <a16:creationId xmlns:a16="http://schemas.microsoft.com/office/drawing/2014/main" id="{46D20E91-93E6-4B34-B105-400C8449C5E4}"/>
+              </a:ext>
+            </a:extLst>
+          </p:cNvPr>
+          <p:cNvSpPr>
+            <a:spLocks noGrp="1"/>
+          </p:cNvSpPr>
+          <p:nvPr>
+            <p:ph idx="1"/>
+          </p:nvPr>
+        </p:nvSpPr>
+        <p:spPr/>
+        <p:txBody>
+          <a:bodyPr/>
+          <a:lstStyle/>
+          <a:p>
+            <a:r>
+              <a:rPr lang="nl-BE" dirty="0" err="1"/>
+              <a:t>Inference</a:t>
+            </a:r>
+            <a:r>
+              <a:rPr lang="nl-BE" dirty="0"/>
+              <a:t> time </a:t>
+            </a:r>
+            <a:r>
+              <a:rPr lang="nl-BE" dirty="0" err="1"/>
+              <a:t>comparison</a:t>
+            </a:r>
+            <a:endParaRPr lang="nl-BE" dirty="0"/>
+          </a:p>
+          <a:p>
+            <a:r>
+              <a:rPr lang="nl-BE" dirty="0"/>
+              <a:t>Double check </a:t>
+            </a:r>
+            <a:r>
+              <a:rPr lang="nl-BE" dirty="0" err="1"/>
+              <a:t>calculations</a:t>
+            </a:r>
+            <a:endParaRPr lang="nl-BE" dirty="0"/>
+          </a:p>
+          <a:p>
+            <a:r>
+              <a:rPr lang="nl-BE" dirty="0" err="1"/>
+              <a:t>Add</a:t>
+            </a:r>
+            <a:r>
+              <a:rPr lang="nl-BE" dirty="0"/>
+              <a:t> PR to input</a:t>
+            </a:r>
+          </a:p>
+          <a:p>
+            <a:r>
+              <a:rPr lang="nl-BE" dirty="0"/>
+              <a:t>New datasets: real and </a:t>
+            </a:r>
+            <a:r>
+              <a:rPr lang="nl-BE" dirty="0" err="1"/>
+              <a:t>simulated</a:t>
+            </a:r>
+            <a:endParaRPr lang="nl-BE" dirty="0"/>
+          </a:p>
+          <a:p>
+            <a:endParaRPr lang="nl-BE" dirty="0"/>
+          </a:p>
+        </p:txBody>
+      </p:sp>
+    </p:spTree>
+    <p:extLst>
+      <p:ext uri="{BB962C8B-B14F-4D97-AF65-F5344CB8AC3E}">
+        <p14:creationId xmlns:p14="http://schemas.microsoft.com/office/powerpoint/2010/main" val="2732600996"/>
       </p:ext>
     </p:extLst>
   </p:cSld>

</xml_diff>